<commit_message>
Updated linePlot to areaPlot
</commit_message>
<xml_diff>
--- a/DeckUpdate/SamplePPT.pptx
+++ b/DeckUpdate/SamplePPT.pptx
@@ -11,6 +11,7 @@
     <p:sldId id="259" r:id="rId5"/>
     <p:sldId id="260" r:id="rId6"/>
     <p:sldId id="261" r:id="rId7"/>
+    <p:sldId id="262" r:id="rId8"/>
   </p:sldIdLst>
   <p:sldSz cx="9144000" cy="6858000" type="screen4x3"/>
   <p:notesSz cx="6858000" cy="9144000"/>
@@ -360,7 +361,7 @@
           <a:p>
             <a:fld id="{10302D39-B686-2742-A69B-CE6D46FC9A4E}" type="datetime4">
               <a:rPr lang="en-US" smtClean="0"/>
-              <a:t>December 12, 2020</a:t>
+              <a:t>December 13, 2020</a:t>
             </a:fld>
             <a:endParaRPr lang="en-US" dirty="0"/>
           </a:p>
@@ -482,356 +483,6 @@
 </p:sldLayout>
 </file>
 
-<file path=ppt/slideLayouts/slideLayout10.xml><?xml version="1.0" encoding="utf-8"?>
-<p:sldLayout xmlns:a="http://schemas.openxmlformats.org/drawingml/2006/main" xmlns:r="http://schemas.openxmlformats.org/officeDocument/2006/relationships" xmlns:p="http://schemas.openxmlformats.org/presentationml/2006/main" type="vertTx" preserve="1">
-  <p:cSld name="Title and Vertical Text">
-    <p:spTree>
-      <p:nvGrpSpPr>
-        <p:cNvPr id="1" name=""/>
-        <p:cNvGrpSpPr/>
-        <p:nvPr/>
-      </p:nvGrpSpPr>
-      <p:grpSpPr>
-        <a:xfrm>
-          <a:off x="0" y="0"/>
-          <a:ext cx="0" cy="0"/>
-          <a:chOff x="0" y="0"/>
-          <a:chExt cx="0" cy="0"/>
-        </a:xfrm>
-      </p:grpSpPr>
-      <p:sp>
-        <p:nvSpPr>
-          <p:cNvPr id="2" name="Title 1"/>
-          <p:cNvSpPr>
-            <a:spLocks noGrp="1"/>
-          </p:cNvSpPr>
-          <p:nvPr>
-            <p:ph type="title"/>
-          </p:nvPr>
-        </p:nvSpPr>
-        <p:spPr/>
-        <p:txBody>
-          <a:bodyPr/>
-          <a:lstStyle/>
-          <a:p>
-            <a:r>
-              <a:rPr lang="en-US" smtClean="0"/>
-              <a:t>Click to edit Master title style</a:t>
-            </a:r>
-            <a:endParaRPr lang="en-US"/>
-          </a:p>
-        </p:txBody>
-      </p:sp>
-      <p:sp>
-        <p:nvSpPr>
-          <p:cNvPr id="3" name="Vertical Text Placeholder 2"/>
-          <p:cNvSpPr>
-            <a:spLocks noGrp="1"/>
-          </p:cNvSpPr>
-          <p:nvPr>
-            <p:ph type="body" orient="vert" idx="1"/>
-          </p:nvPr>
-        </p:nvSpPr>
-        <p:spPr/>
-        <p:txBody>
-          <a:bodyPr vert="eaVert"/>
-          <a:lstStyle/>
-          <a:p>
-            <a:pPr lvl="0"/>
-            <a:r>
-              <a:rPr lang="en-US" smtClean="0"/>
-              <a:t>Click to edit Master text styles</a:t>
-            </a:r>
-          </a:p>
-          <a:p>
-            <a:pPr lvl="1"/>
-            <a:r>
-              <a:rPr lang="en-US" smtClean="0"/>
-              <a:t>Second level</a:t>
-            </a:r>
-          </a:p>
-          <a:p>
-            <a:pPr lvl="2"/>
-            <a:r>
-              <a:rPr lang="en-US" smtClean="0"/>
-              <a:t>Third level</a:t>
-            </a:r>
-          </a:p>
-          <a:p>
-            <a:pPr lvl="3"/>
-            <a:r>
-              <a:rPr lang="en-US" smtClean="0"/>
-              <a:t>Fourth level</a:t>
-            </a:r>
-          </a:p>
-          <a:p>
-            <a:pPr lvl="4"/>
-            <a:r>
-              <a:rPr lang="en-US" smtClean="0"/>
-              <a:t>Fifth level</a:t>
-            </a:r>
-            <a:endParaRPr lang="en-US"/>
-          </a:p>
-        </p:txBody>
-      </p:sp>
-      <p:sp>
-        <p:nvSpPr>
-          <p:cNvPr id="4" name="Date Placeholder 3"/>
-          <p:cNvSpPr>
-            <a:spLocks noGrp="1"/>
-          </p:cNvSpPr>
-          <p:nvPr>
-            <p:ph type="dt" sz="half" idx="10"/>
-          </p:nvPr>
-        </p:nvSpPr>
-        <p:spPr/>
-        <p:txBody>
-          <a:bodyPr/>
-          <a:lstStyle/>
-          <a:p>
-            <a:fld id="{241EB5C9-1307-BA42-ABA2-0BC069CD8E7F}" type="datetimeFigureOut">
-              <a:rPr lang="en-US" smtClean="0"/>
-              <a:t>4/5/2019</a:t>
-            </a:fld>
-            <a:endParaRPr lang="en-US"/>
-          </a:p>
-        </p:txBody>
-      </p:sp>
-      <p:sp>
-        <p:nvSpPr>
-          <p:cNvPr id="5" name="Footer Placeholder 4"/>
-          <p:cNvSpPr>
-            <a:spLocks noGrp="1"/>
-          </p:cNvSpPr>
-          <p:nvPr>
-            <p:ph type="ftr" sz="quarter" idx="11"/>
-          </p:nvPr>
-        </p:nvSpPr>
-        <p:spPr/>
-        <p:txBody>
-          <a:bodyPr/>
-          <a:lstStyle/>
-          <a:p>
-            <a:endParaRPr lang="en-US"/>
-          </a:p>
-        </p:txBody>
-      </p:sp>
-      <p:sp>
-        <p:nvSpPr>
-          <p:cNvPr id="6" name="Slide Number Placeholder 5"/>
-          <p:cNvSpPr>
-            <a:spLocks noGrp="1"/>
-          </p:cNvSpPr>
-          <p:nvPr>
-            <p:ph type="sldNum" sz="quarter" idx="12"/>
-          </p:nvPr>
-        </p:nvSpPr>
-        <p:spPr/>
-        <p:txBody>
-          <a:bodyPr/>
-          <a:lstStyle/>
-          <a:p>
-            <a:fld id="{C5EF2332-01BF-834F-8236-50238282D533}" type="slidenum">
-              <a:rPr lang="en-US" smtClean="0"/>
-              <a:t>‹#›</a:t>
-            </a:fld>
-            <a:endParaRPr lang="en-US"/>
-          </a:p>
-        </p:txBody>
-      </p:sp>
-    </p:spTree>
-    <p:extLst>
-      <p:ext uri="{BB962C8B-B14F-4D97-AF65-F5344CB8AC3E}">
-        <p14:creationId xmlns:p14="http://schemas.microsoft.com/office/powerpoint/2010/main" val="313914798"/>
-      </p:ext>
-    </p:extLst>
-  </p:cSld>
-  <p:clrMapOvr>
-    <a:masterClrMapping/>
-  </p:clrMapOvr>
-</p:sldLayout>
-</file>
-
-<file path=ppt/slideLayouts/slideLayout11.xml><?xml version="1.0" encoding="utf-8"?>
-<p:sldLayout xmlns:a="http://schemas.openxmlformats.org/drawingml/2006/main" xmlns:r="http://schemas.openxmlformats.org/officeDocument/2006/relationships" xmlns:p="http://schemas.openxmlformats.org/presentationml/2006/main" type="vertTitleAndTx" preserve="1">
-  <p:cSld name="Vertical Title and Text">
-    <p:spTree>
-      <p:nvGrpSpPr>
-        <p:cNvPr id="1" name=""/>
-        <p:cNvGrpSpPr/>
-        <p:nvPr/>
-      </p:nvGrpSpPr>
-      <p:grpSpPr>
-        <a:xfrm>
-          <a:off x="0" y="0"/>
-          <a:ext cx="0" cy="0"/>
-          <a:chOff x="0" y="0"/>
-          <a:chExt cx="0" cy="0"/>
-        </a:xfrm>
-      </p:grpSpPr>
-      <p:sp>
-        <p:nvSpPr>
-          <p:cNvPr id="2" name="Vertical Title 1"/>
-          <p:cNvSpPr>
-            <a:spLocks noGrp="1"/>
-          </p:cNvSpPr>
-          <p:nvPr>
-            <p:ph type="title" orient="vert"/>
-          </p:nvPr>
-        </p:nvSpPr>
-        <p:spPr>
-          <a:xfrm>
-            <a:off x="6629400" y="274638"/>
-            <a:ext cx="2057400" cy="5851525"/>
-          </a:xfrm>
-        </p:spPr>
-        <p:txBody>
-          <a:bodyPr vert="eaVert"/>
-          <a:lstStyle/>
-          <a:p>
-            <a:r>
-              <a:rPr lang="en-US" smtClean="0"/>
-              <a:t>Click to edit Master title style</a:t>
-            </a:r>
-            <a:endParaRPr lang="en-US"/>
-          </a:p>
-        </p:txBody>
-      </p:sp>
-      <p:sp>
-        <p:nvSpPr>
-          <p:cNvPr id="3" name="Vertical Text Placeholder 2"/>
-          <p:cNvSpPr>
-            <a:spLocks noGrp="1"/>
-          </p:cNvSpPr>
-          <p:nvPr>
-            <p:ph type="body" orient="vert" idx="1"/>
-          </p:nvPr>
-        </p:nvSpPr>
-        <p:spPr>
-          <a:xfrm>
-            <a:off x="457200" y="274638"/>
-            <a:ext cx="6019800" cy="5851525"/>
-          </a:xfrm>
-        </p:spPr>
-        <p:txBody>
-          <a:bodyPr vert="eaVert"/>
-          <a:lstStyle/>
-          <a:p>
-            <a:pPr lvl="0"/>
-            <a:r>
-              <a:rPr lang="en-US" smtClean="0"/>
-              <a:t>Click to edit Master text styles</a:t>
-            </a:r>
-          </a:p>
-          <a:p>
-            <a:pPr lvl="1"/>
-            <a:r>
-              <a:rPr lang="en-US" smtClean="0"/>
-              <a:t>Second level</a:t>
-            </a:r>
-          </a:p>
-          <a:p>
-            <a:pPr lvl="2"/>
-            <a:r>
-              <a:rPr lang="en-US" smtClean="0"/>
-              <a:t>Third level</a:t>
-            </a:r>
-          </a:p>
-          <a:p>
-            <a:pPr lvl="3"/>
-            <a:r>
-              <a:rPr lang="en-US" smtClean="0"/>
-              <a:t>Fourth level</a:t>
-            </a:r>
-          </a:p>
-          <a:p>
-            <a:pPr lvl="4"/>
-            <a:r>
-              <a:rPr lang="en-US" smtClean="0"/>
-              <a:t>Fifth level</a:t>
-            </a:r>
-            <a:endParaRPr lang="en-US"/>
-          </a:p>
-        </p:txBody>
-      </p:sp>
-      <p:sp>
-        <p:nvSpPr>
-          <p:cNvPr id="4" name="Date Placeholder 3"/>
-          <p:cNvSpPr>
-            <a:spLocks noGrp="1"/>
-          </p:cNvSpPr>
-          <p:nvPr>
-            <p:ph type="dt" sz="half" idx="10"/>
-          </p:nvPr>
-        </p:nvSpPr>
-        <p:spPr/>
-        <p:txBody>
-          <a:bodyPr/>
-          <a:lstStyle/>
-          <a:p>
-            <a:fld id="{241EB5C9-1307-BA42-ABA2-0BC069CD8E7F}" type="datetimeFigureOut">
-              <a:rPr lang="en-US" smtClean="0"/>
-              <a:t>4/5/2019</a:t>
-            </a:fld>
-            <a:endParaRPr lang="en-US"/>
-          </a:p>
-        </p:txBody>
-      </p:sp>
-      <p:sp>
-        <p:nvSpPr>
-          <p:cNvPr id="5" name="Footer Placeholder 4"/>
-          <p:cNvSpPr>
-            <a:spLocks noGrp="1"/>
-          </p:cNvSpPr>
-          <p:nvPr>
-            <p:ph type="ftr" sz="quarter" idx="11"/>
-          </p:nvPr>
-        </p:nvSpPr>
-        <p:spPr/>
-        <p:txBody>
-          <a:bodyPr/>
-          <a:lstStyle/>
-          <a:p>
-            <a:endParaRPr lang="en-US"/>
-          </a:p>
-        </p:txBody>
-      </p:sp>
-      <p:sp>
-        <p:nvSpPr>
-          <p:cNvPr id="6" name="Slide Number Placeholder 5"/>
-          <p:cNvSpPr>
-            <a:spLocks noGrp="1"/>
-          </p:cNvSpPr>
-          <p:nvPr>
-            <p:ph type="sldNum" sz="quarter" idx="12"/>
-          </p:nvPr>
-        </p:nvSpPr>
-        <p:spPr/>
-        <p:txBody>
-          <a:bodyPr/>
-          <a:lstStyle/>
-          <a:p>
-            <a:fld id="{C5EF2332-01BF-834F-8236-50238282D533}" type="slidenum">
-              <a:rPr lang="en-US" smtClean="0"/>
-              <a:t>‹#›</a:t>
-            </a:fld>
-            <a:endParaRPr lang="en-US"/>
-          </a:p>
-        </p:txBody>
-      </p:sp>
-    </p:spTree>
-    <p:extLst>
-      <p:ext uri="{BB962C8B-B14F-4D97-AF65-F5344CB8AC3E}">
-        <p14:creationId xmlns:p14="http://schemas.microsoft.com/office/powerpoint/2010/main" val="2581529045"/>
-      </p:ext>
-    </p:extLst>
-  </p:cSld>
-  <p:clrMapOvr>
-    <a:masterClrMapping/>
-  </p:clrMapOvr>
-</p:sldLayout>
-</file>
-
 <file path=ppt/slideLayouts/slideLayout2.xml><?xml version="1.0" encoding="utf-8"?>
 <p:sldLayout xmlns:a="http://schemas.openxmlformats.org/drawingml/2006/main" xmlns:r="http://schemas.openxmlformats.org/officeDocument/2006/relationships" xmlns:p="http://schemas.openxmlformats.org/presentationml/2006/main" preserve="1" userDrawn="1">
   <p:cSld name="Content (Text &amp; Graph)">
@@ -1031,7 +682,7 @@
           <a:p>
             <a:fld id="{585AD263-A788-3145-8D38-AEBC1D444AEE}" type="datetime4">
               <a:rPr lang="en-US" smtClean="0"/>
-              <a:t>December 12, 2020</a:t>
+              <a:t>December 13, 2020</a:t>
             </a:fld>
             <a:endParaRPr lang="en-US" dirty="0"/>
           </a:p>
@@ -1321,7 +972,7 @@
           <a:p>
             <a:fld id="{B606C5D1-9323-1B45-8355-7D55EA8EE66A}" type="datetime4">
               <a:rPr lang="en-US" smtClean="0"/>
-              <a:t>December 12, 2020</a:t>
+              <a:t>December 13, 2020</a:t>
             </a:fld>
             <a:endParaRPr lang="en-US" dirty="0"/>
           </a:p>
@@ -1569,7 +1220,7 @@
           <a:p>
             <a:fld id="{A4108F21-3CFE-3045-9ABB-E1E1413BA1A1}" type="datetime4">
               <a:rPr lang="en-US" smtClean="0"/>
-              <a:t>December 12, 2020</a:t>
+              <a:t>December 13, 2020</a:t>
             </a:fld>
             <a:endParaRPr lang="en-US" dirty="0"/>
           </a:p>
@@ -1801,1171 +1452,6 @@
   </p:cSld>
   <p:clrMapOvr>
     <a:overrideClrMapping bg1="dk1" tx1="lt1" bg2="dk2" tx2="lt2" accent1="accent1" accent2="accent2" accent3="accent3" accent4="accent4" accent5="accent5" accent6="accent6" hlink="hlink" folHlink="folHlink"/>
-  </p:clrMapOvr>
-</p:sldLayout>
-</file>
-
-<file path=ppt/slideLayouts/slideLayout5.xml><?xml version="1.0" encoding="utf-8"?>
-<p:sldLayout xmlns:a="http://schemas.openxmlformats.org/drawingml/2006/main" xmlns:r="http://schemas.openxmlformats.org/officeDocument/2006/relationships" xmlns:p="http://schemas.openxmlformats.org/presentationml/2006/main" type="twoTxTwoObj" preserve="1">
-  <p:cSld name="Comparison">
-    <p:spTree>
-      <p:nvGrpSpPr>
-        <p:cNvPr id="1" name=""/>
-        <p:cNvGrpSpPr/>
-        <p:nvPr/>
-      </p:nvGrpSpPr>
-      <p:grpSpPr>
-        <a:xfrm>
-          <a:off x="0" y="0"/>
-          <a:ext cx="0" cy="0"/>
-          <a:chOff x="0" y="0"/>
-          <a:chExt cx="0" cy="0"/>
-        </a:xfrm>
-      </p:grpSpPr>
-      <p:sp>
-        <p:nvSpPr>
-          <p:cNvPr id="2" name="Title 1"/>
-          <p:cNvSpPr>
-            <a:spLocks noGrp="1"/>
-          </p:cNvSpPr>
-          <p:nvPr>
-            <p:ph type="title"/>
-          </p:nvPr>
-        </p:nvSpPr>
-        <p:spPr/>
-        <p:txBody>
-          <a:bodyPr/>
-          <a:lstStyle>
-            <a:lvl1pPr>
-              <a:defRPr/>
-            </a:lvl1pPr>
-          </a:lstStyle>
-          <a:p>
-            <a:r>
-              <a:rPr lang="en-US" smtClean="0"/>
-              <a:t>Click to edit Master title style</a:t>
-            </a:r>
-            <a:endParaRPr lang="en-US"/>
-          </a:p>
-        </p:txBody>
-      </p:sp>
-      <p:sp>
-        <p:nvSpPr>
-          <p:cNvPr id="3" name="Text Placeholder 2"/>
-          <p:cNvSpPr>
-            <a:spLocks noGrp="1"/>
-          </p:cNvSpPr>
-          <p:nvPr>
-            <p:ph type="body" idx="1"/>
-          </p:nvPr>
-        </p:nvSpPr>
-        <p:spPr>
-          <a:xfrm>
-            <a:off x="457200" y="1535113"/>
-            <a:ext cx="4040188" cy="639762"/>
-          </a:xfrm>
-        </p:spPr>
-        <p:txBody>
-          <a:bodyPr anchor="b"/>
-          <a:lstStyle>
-            <a:lvl1pPr marL="0" indent="0">
-              <a:buNone/>
-              <a:defRPr sz="2400" b="1"/>
-            </a:lvl1pPr>
-            <a:lvl2pPr marL="457200" indent="0">
-              <a:buNone/>
-              <a:defRPr sz="2000" b="1"/>
-            </a:lvl2pPr>
-            <a:lvl3pPr marL="914400" indent="0">
-              <a:buNone/>
-              <a:defRPr sz="1800" b="1"/>
-            </a:lvl3pPr>
-            <a:lvl4pPr marL="1371600" indent="0">
-              <a:buNone/>
-              <a:defRPr sz="1600" b="1"/>
-            </a:lvl4pPr>
-            <a:lvl5pPr marL="1828800" indent="0">
-              <a:buNone/>
-              <a:defRPr sz="1600" b="1"/>
-            </a:lvl5pPr>
-            <a:lvl6pPr marL="2286000" indent="0">
-              <a:buNone/>
-              <a:defRPr sz="1600" b="1"/>
-            </a:lvl6pPr>
-            <a:lvl7pPr marL="2743200" indent="0">
-              <a:buNone/>
-              <a:defRPr sz="1600" b="1"/>
-            </a:lvl7pPr>
-            <a:lvl8pPr marL="3200400" indent="0">
-              <a:buNone/>
-              <a:defRPr sz="1600" b="1"/>
-            </a:lvl8pPr>
-            <a:lvl9pPr marL="3657600" indent="0">
-              <a:buNone/>
-              <a:defRPr sz="1600" b="1"/>
-            </a:lvl9pPr>
-          </a:lstStyle>
-          <a:p>
-            <a:pPr lvl="0"/>
-            <a:r>
-              <a:rPr lang="en-US" smtClean="0"/>
-              <a:t>Click to edit Master text styles</a:t>
-            </a:r>
-          </a:p>
-        </p:txBody>
-      </p:sp>
-      <p:sp>
-        <p:nvSpPr>
-          <p:cNvPr id="4" name="Content Placeholder 3"/>
-          <p:cNvSpPr>
-            <a:spLocks noGrp="1"/>
-          </p:cNvSpPr>
-          <p:nvPr>
-            <p:ph sz="half" idx="2"/>
-          </p:nvPr>
-        </p:nvSpPr>
-        <p:spPr>
-          <a:xfrm>
-            <a:off x="457200" y="2174875"/>
-            <a:ext cx="4040188" cy="3951288"/>
-          </a:xfrm>
-        </p:spPr>
-        <p:txBody>
-          <a:bodyPr/>
-          <a:lstStyle>
-            <a:lvl1pPr>
-              <a:defRPr sz="2400"/>
-            </a:lvl1pPr>
-            <a:lvl2pPr>
-              <a:defRPr sz="2000"/>
-            </a:lvl2pPr>
-            <a:lvl3pPr>
-              <a:defRPr sz="1800"/>
-            </a:lvl3pPr>
-            <a:lvl4pPr>
-              <a:defRPr sz="1600"/>
-            </a:lvl4pPr>
-            <a:lvl5pPr>
-              <a:defRPr sz="1600"/>
-            </a:lvl5pPr>
-            <a:lvl6pPr>
-              <a:defRPr sz="1600"/>
-            </a:lvl6pPr>
-            <a:lvl7pPr>
-              <a:defRPr sz="1600"/>
-            </a:lvl7pPr>
-            <a:lvl8pPr>
-              <a:defRPr sz="1600"/>
-            </a:lvl8pPr>
-            <a:lvl9pPr>
-              <a:defRPr sz="1600"/>
-            </a:lvl9pPr>
-          </a:lstStyle>
-          <a:p>
-            <a:pPr lvl="0"/>
-            <a:r>
-              <a:rPr lang="en-US" smtClean="0"/>
-              <a:t>Click to edit Master text styles</a:t>
-            </a:r>
-          </a:p>
-          <a:p>
-            <a:pPr lvl="1"/>
-            <a:r>
-              <a:rPr lang="en-US" smtClean="0"/>
-              <a:t>Second level</a:t>
-            </a:r>
-          </a:p>
-          <a:p>
-            <a:pPr lvl="2"/>
-            <a:r>
-              <a:rPr lang="en-US" smtClean="0"/>
-              <a:t>Third level</a:t>
-            </a:r>
-          </a:p>
-          <a:p>
-            <a:pPr lvl="3"/>
-            <a:r>
-              <a:rPr lang="en-US" smtClean="0"/>
-              <a:t>Fourth level</a:t>
-            </a:r>
-          </a:p>
-          <a:p>
-            <a:pPr lvl="4"/>
-            <a:r>
-              <a:rPr lang="en-US" smtClean="0"/>
-              <a:t>Fifth level</a:t>
-            </a:r>
-            <a:endParaRPr lang="en-US"/>
-          </a:p>
-        </p:txBody>
-      </p:sp>
-      <p:sp>
-        <p:nvSpPr>
-          <p:cNvPr id="5" name="Text Placeholder 4"/>
-          <p:cNvSpPr>
-            <a:spLocks noGrp="1"/>
-          </p:cNvSpPr>
-          <p:nvPr>
-            <p:ph type="body" sz="quarter" idx="3"/>
-          </p:nvPr>
-        </p:nvSpPr>
-        <p:spPr>
-          <a:xfrm>
-            <a:off x="4645025" y="1535113"/>
-            <a:ext cx="4041775" cy="639762"/>
-          </a:xfrm>
-        </p:spPr>
-        <p:txBody>
-          <a:bodyPr anchor="b"/>
-          <a:lstStyle>
-            <a:lvl1pPr marL="0" indent="0">
-              <a:buNone/>
-              <a:defRPr sz="2400" b="1"/>
-            </a:lvl1pPr>
-            <a:lvl2pPr marL="457200" indent="0">
-              <a:buNone/>
-              <a:defRPr sz="2000" b="1"/>
-            </a:lvl2pPr>
-            <a:lvl3pPr marL="914400" indent="0">
-              <a:buNone/>
-              <a:defRPr sz="1800" b="1"/>
-            </a:lvl3pPr>
-            <a:lvl4pPr marL="1371600" indent="0">
-              <a:buNone/>
-              <a:defRPr sz="1600" b="1"/>
-            </a:lvl4pPr>
-            <a:lvl5pPr marL="1828800" indent="0">
-              <a:buNone/>
-              <a:defRPr sz="1600" b="1"/>
-            </a:lvl5pPr>
-            <a:lvl6pPr marL="2286000" indent="0">
-              <a:buNone/>
-              <a:defRPr sz="1600" b="1"/>
-            </a:lvl6pPr>
-            <a:lvl7pPr marL="2743200" indent="0">
-              <a:buNone/>
-              <a:defRPr sz="1600" b="1"/>
-            </a:lvl7pPr>
-            <a:lvl8pPr marL="3200400" indent="0">
-              <a:buNone/>
-              <a:defRPr sz="1600" b="1"/>
-            </a:lvl8pPr>
-            <a:lvl9pPr marL="3657600" indent="0">
-              <a:buNone/>
-              <a:defRPr sz="1600" b="1"/>
-            </a:lvl9pPr>
-          </a:lstStyle>
-          <a:p>
-            <a:pPr lvl="0"/>
-            <a:r>
-              <a:rPr lang="en-US" smtClean="0"/>
-              <a:t>Click to edit Master text styles</a:t>
-            </a:r>
-          </a:p>
-        </p:txBody>
-      </p:sp>
-      <p:sp>
-        <p:nvSpPr>
-          <p:cNvPr id="6" name="Content Placeholder 5"/>
-          <p:cNvSpPr>
-            <a:spLocks noGrp="1"/>
-          </p:cNvSpPr>
-          <p:nvPr>
-            <p:ph sz="quarter" idx="4"/>
-          </p:nvPr>
-        </p:nvSpPr>
-        <p:spPr>
-          <a:xfrm>
-            <a:off x="4645025" y="2174875"/>
-            <a:ext cx="4041775" cy="3951288"/>
-          </a:xfrm>
-        </p:spPr>
-        <p:txBody>
-          <a:bodyPr/>
-          <a:lstStyle>
-            <a:lvl1pPr>
-              <a:defRPr sz="2400"/>
-            </a:lvl1pPr>
-            <a:lvl2pPr>
-              <a:defRPr sz="2000"/>
-            </a:lvl2pPr>
-            <a:lvl3pPr>
-              <a:defRPr sz="1800"/>
-            </a:lvl3pPr>
-            <a:lvl4pPr>
-              <a:defRPr sz="1600"/>
-            </a:lvl4pPr>
-            <a:lvl5pPr>
-              <a:defRPr sz="1600"/>
-            </a:lvl5pPr>
-            <a:lvl6pPr>
-              <a:defRPr sz="1600"/>
-            </a:lvl6pPr>
-            <a:lvl7pPr>
-              <a:defRPr sz="1600"/>
-            </a:lvl7pPr>
-            <a:lvl8pPr>
-              <a:defRPr sz="1600"/>
-            </a:lvl8pPr>
-            <a:lvl9pPr>
-              <a:defRPr sz="1600"/>
-            </a:lvl9pPr>
-          </a:lstStyle>
-          <a:p>
-            <a:pPr lvl="0"/>
-            <a:r>
-              <a:rPr lang="en-US" smtClean="0"/>
-              <a:t>Click to edit Master text styles</a:t>
-            </a:r>
-          </a:p>
-          <a:p>
-            <a:pPr lvl="1"/>
-            <a:r>
-              <a:rPr lang="en-US" smtClean="0"/>
-              <a:t>Second level</a:t>
-            </a:r>
-          </a:p>
-          <a:p>
-            <a:pPr lvl="2"/>
-            <a:r>
-              <a:rPr lang="en-US" smtClean="0"/>
-              <a:t>Third level</a:t>
-            </a:r>
-          </a:p>
-          <a:p>
-            <a:pPr lvl="3"/>
-            <a:r>
-              <a:rPr lang="en-US" smtClean="0"/>
-              <a:t>Fourth level</a:t>
-            </a:r>
-          </a:p>
-          <a:p>
-            <a:pPr lvl="4"/>
-            <a:r>
-              <a:rPr lang="en-US" smtClean="0"/>
-              <a:t>Fifth level</a:t>
-            </a:r>
-            <a:endParaRPr lang="en-US"/>
-          </a:p>
-        </p:txBody>
-      </p:sp>
-      <p:sp>
-        <p:nvSpPr>
-          <p:cNvPr id="7" name="Date Placeholder 6"/>
-          <p:cNvSpPr>
-            <a:spLocks noGrp="1"/>
-          </p:cNvSpPr>
-          <p:nvPr>
-            <p:ph type="dt" sz="half" idx="10"/>
-          </p:nvPr>
-        </p:nvSpPr>
-        <p:spPr/>
-        <p:txBody>
-          <a:bodyPr/>
-          <a:lstStyle/>
-          <a:p>
-            <a:fld id="{241EB5C9-1307-BA42-ABA2-0BC069CD8E7F}" type="datetimeFigureOut">
-              <a:rPr lang="en-US" smtClean="0"/>
-              <a:t>4/5/2019</a:t>
-            </a:fld>
-            <a:endParaRPr lang="en-US"/>
-          </a:p>
-        </p:txBody>
-      </p:sp>
-      <p:sp>
-        <p:nvSpPr>
-          <p:cNvPr id="8" name="Footer Placeholder 7"/>
-          <p:cNvSpPr>
-            <a:spLocks noGrp="1"/>
-          </p:cNvSpPr>
-          <p:nvPr>
-            <p:ph type="ftr" sz="quarter" idx="11"/>
-          </p:nvPr>
-        </p:nvSpPr>
-        <p:spPr/>
-        <p:txBody>
-          <a:bodyPr/>
-          <a:lstStyle/>
-          <a:p>
-            <a:endParaRPr lang="en-US"/>
-          </a:p>
-        </p:txBody>
-      </p:sp>
-      <p:sp>
-        <p:nvSpPr>
-          <p:cNvPr id="9" name="Slide Number Placeholder 8"/>
-          <p:cNvSpPr>
-            <a:spLocks noGrp="1"/>
-          </p:cNvSpPr>
-          <p:nvPr>
-            <p:ph type="sldNum" sz="quarter" idx="12"/>
-          </p:nvPr>
-        </p:nvSpPr>
-        <p:spPr/>
-        <p:txBody>
-          <a:bodyPr/>
-          <a:lstStyle/>
-          <a:p>
-            <a:fld id="{C5EF2332-01BF-834F-8236-50238282D533}" type="slidenum">
-              <a:rPr lang="en-US" smtClean="0"/>
-              <a:t>‹#›</a:t>
-            </a:fld>
-            <a:endParaRPr lang="en-US"/>
-          </a:p>
-        </p:txBody>
-      </p:sp>
-    </p:spTree>
-    <p:extLst>
-      <p:ext uri="{BB962C8B-B14F-4D97-AF65-F5344CB8AC3E}">
-        <p14:creationId xmlns:p14="http://schemas.microsoft.com/office/powerpoint/2010/main" val="2535793967"/>
-      </p:ext>
-    </p:extLst>
-  </p:cSld>
-  <p:clrMapOvr>
-    <a:masterClrMapping/>
-  </p:clrMapOvr>
-</p:sldLayout>
-</file>
-
-<file path=ppt/slideLayouts/slideLayout6.xml><?xml version="1.0" encoding="utf-8"?>
-<p:sldLayout xmlns:a="http://schemas.openxmlformats.org/drawingml/2006/main" xmlns:r="http://schemas.openxmlformats.org/officeDocument/2006/relationships" xmlns:p="http://schemas.openxmlformats.org/presentationml/2006/main" type="titleOnly" preserve="1">
-  <p:cSld name="Title Only">
-    <p:spTree>
-      <p:nvGrpSpPr>
-        <p:cNvPr id="1" name=""/>
-        <p:cNvGrpSpPr/>
-        <p:nvPr/>
-      </p:nvGrpSpPr>
-      <p:grpSpPr>
-        <a:xfrm>
-          <a:off x="0" y="0"/>
-          <a:ext cx="0" cy="0"/>
-          <a:chOff x="0" y="0"/>
-          <a:chExt cx="0" cy="0"/>
-        </a:xfrm>
-      </p:grpSpPr>
-      <p:sp>
-        <p:nvSpPr>
-          <p:cNvPr id="2" name="Title 1"/>
-          <p:cNvSpPr>
-            <a:spLocks noGrp="1"/>
-          </p:cNvSpPr>
-          <p:nvPr>
-            <p:ph type="title"/>
-          </p:nvPr>
-        </p:nvSpPr>
-        <p:spPr/>
-        <p:txBody>
-          <a:bodyPr/>
-          <a:lstStyle/>
-          <a:p>
-            <a:r>
-              <a:rPr lang="en-US" smtClean="0"/>
-              <a:t>Click to edit Master title style</a:t>
-            </a:r>
-            <a:endParaRPr lang="en-US"/>
-          </a:p>
-        </p:txBody>
-      </p:sp>
-      <p:sp>
-        <p:nvSpPr>
-          <p:cNvPr id="3" name="Date Placeholder 2"/>
-          <p:cNvSpPr>
-            <a:spLocks noGrp="1"/>
-          </p:cNvSpPr>
-          <p:nvPr>
-            <p:ph type="dt" sz="half" idx="10"/>
-          </p:nvPr>
-        </p:nvSpPr>
-        <p:spPr/>
-        <p:txBody>
-          <a:bodyPr/>
-          <a:lstStyle/>
-          <a:p>
-            <a:fld id="{241EB5C9-1307-BA42-ABA2-0BC069CD8E7F}" type="datetimeFigureOut">
-              <a:rPr lang="en-US" smtClean="0"/>
-              <a:t>4/5/2019</a:t>
-            </a:fld>
-            <a:endParaRPr lang="en-US"/>
-          </a:p>
-        </p:txBody>
-      </p:sp>
-      <p:sp>
-        <p:nvSpPr>
-          <p:cNvPr id="4" name="Footer Placeholder 3"/>
-          <p:cNvSpPr>
-            <a:spLocks noGrp="1"/>
-          </p:cNvSpPr>
-          <p:nvPr>
-            <p:ph type="ftr" sz="quarter" idx="11"/>
-          </p:nvPr>
-        </p:nvSpPr>
-        <p:spPr/>
-        <p:txBody>
-          <a:bodyPr/>
-          <a:lstStyle/>
-          <a:p>
-            <a:endParaRPr lang="en-US"/>
-          </a:p>
-        </p:txBody>
-      </p:sp>
-      <p:sp>
-        <p:nvSpPr>
-          <p:cNvPr id="5" name="Slide Number Placeholder 4"/>
-          <p:cNvSpPr>
-            <a:spLocks noGrp="1"/>
-          </p:cNvSpPr>
-          <p:nvPr>
-            <p:ph type="sldNum" sz="quarter" idx="12"/>
-          </p:nvPr>
-        </p:nvSpPr>
-        <p:spPr/>
-        <p:txBody>
-          <a:bodyPr/>
-          <a:lstStyle/>
-          <a:p>
-            <a:fld id="{C5EF2332-01BF-834F-8236-50238282D533}" type="slidenum">
-              <a:rPr lang="en-US" smtClean="0"/>
-              <a:t>‹#›</a:t>
-            </a:fld>
-            <a:endParaRPr lang="en-US"/>
-          </a:p>
-        </p:txBody>
-      </p:sp>
-    </p:spTree>
-    <p:extLst>
-      <p:ext uri="{BB962C8B-B14F-4D97-AF65-F5344CB8AC3E}">
-        <p14:creationId xmlns:p14="http://schemas.microsoft.com/office/powerpoint/2010/main" val="3472721253"/>
-      </p:ext>
-    </p:extLst>
-  </p:cSld>
-  <p:clrMapOvr>
-    <a:masterClrMapping/>
-  </p:clrMapOvr>
-</p:sldLayout>
-</file>
-
-<file path=ppt/slideLayouts/slideLayout7.xml><?xml version="1.0" encoding="utf-8"?>
-<p:sldLayout xmlns:a="http://schemas.openxmlformats.org/drawingml/2006/main" xmlns:r="http://schemas.openxmlformats.org/officeDocument/2006/relationships" xmlns:p="http://schemas.openxmlformats.org/presentationml/2006/main" type="blank" preserve="1">
-  <p:cSld name="Blank">
-    <p:spTree>
-      <p:nvGrpSpPr>
-        <p:cNvPr id="1" name=""/>
-        <p:cNvGrpSpPr/>
-        <p:nvPr/>
-      </p:nvGrpSpPr>
-      <p:grpSpPr>
-        <a:xfrm>
-          <a:off x="0" y="0"/>
-          <a:ext cx="0" cy="0"/>
-          <a:chOff x="0" y="0"/>
-          <a:chExt cx="0" cy="0"/>
-        </a:xfrm>
-      </p:grpSpPr>
-      <p:sp>
-        <p:nvSpPr>
-          <p:cNvPr id="2" name="Date Placeholder 1"/>
-          <p:cNvSpPr>
-            <a:spLocks noGrp="1"/>
-          </p:cNvSpPr>
-          <p:nvPr>
-            <p:ph type="dt" sz="half" idx="10"/>
-          </p:nvPr>
-        </p:nvSpPr>
-        <p:spPr/>
-        <p:txBody>
-          <a:bodyPr/>
-          <a:lstStyle/>
-          <a:p>
-            <a:fld id="{241EB5C9-1307-BA42-ABA2-0BC069CD8E7F}" type="datetimeFigureOut">
-              <a:rPr lang="en-US" smtClean="0"/>
-              <a:t>4/5/2019</a:t>
-            </a:fld>
-            <a:endParaRPr lang="en-US"/>
-          </a:p>
-        </p:txBody>
-      </p:sp>
-      <p:sp>
-        <p:nvSpPr>
-          <p:cNvPr id="3" name="Footer Placeholder 2"/>
-          <p:cNvSpPr>
-            <a:spLocks noGrp="1"/>
-          </p:cNvSpPr>
-          <p:nvPr>
-            <p:ph type="ftr" sz="quarter" idx="11"/>
-          </p:nvPr>
-        </p:nvSpPr>
-        <p:spPr/>
-        <p:txBody>
-          <a:bodyPr/>
-          <a:lstStyle/>
-          <a:p>
-            <a:endParaRPr lang="en-US"/>
-          </a:p>
-        </p:txBody>
-      </p:sp>
-      <p:sp>
-        <p:nvSpPr>
-          <p:cNvPr id="4" name="Slide Number Placeholder 3"/>
-          <p:cNvSpPr>
-            <a:spLocks noGrp="1"/>
-          </p:cNvSpPr>
-          <p:nvPr>
-            <p:ph type="sldNum" sz="quarter" idx="12"/>
-          </p:nvPr>
-        </p:nvSpPr>
-        <p:spPr/>
-        <p:txBody>
-          <a:bodyPr/>
-          <a:lstStyle/>
-          <a:p>
-            <a:fld id="{C5EF2332-01BF-834F-8236-50238282D533}" type="slidenum">
-              <a:rPr lang="en-US" smtClean="0"/>
-              <a:t>‹#›</a:t>
-            </a:fld>
-            <a:endParaRPr lang="en-US"/>
-          </a:p>
-        </p:txBody>
-      </p:sp>
-    </p:spTree>
-    <p:extLst>
-      <p:ext uri="{BB962C8B-B14F-4D97-AF65-F5344CB8AC3E}">
-        <p14:creationId xmlns:p14="http://schemas.microsoft.com/office/powerpoint/2010/main" val="2130901097"/>
-      </p:ext>
-    </p:extLst>
-  </p:cSld>
-  <p:clrMapOvr>
-    <a:masterClrMapping/>
-  </p:clrMapOvr>
-</p:sldLayout>
-</file>
-
-<file path=ppt/slideLayouts/slideLayout8.xml><?xml version="1.0" encoding="utf-8"?>
-<p:sldLayout xmlns:a="http://schemas.openxmlformats.org/drawingml/2006/main" xmlns:r="http://schemas.openxmlformats.org/officeDocument/2006/relationships" xmlns:p="http://schemas.openxmlformats.org/presentationml/2006/main" type="objTx" preserve="1">
-  <p:cSld name="Content with Caption">
-    <p:spTree>
-      <p:nvGrpSpPr>
-        <p:cNvPr id="1" name=""/>
-        <p:cNvGrpSpPr/>
-        <p:nvPr/>
-      </p:nvGrpSpPr>
-      <p:grpSpPr>
-        <a:xfrm>
-          <a:off x="0" y="0"/>
-          <a:ext cx="0" cy="0"/>
-          <a:chOff x="0" y="0"/>
-          <a:chExt cx="0" cy="0"/>
-        </a:xfrm>
-      </p:grpSpPr>
-      <p:sp>
-        <p:nvSpPr>
-          <p:cNvPr id="2" name="Title 1"/>
-          <p:cNvSpPr>
-            <a:spLocks noGrp="1"/>
-          </p:cNvSpPr>
-          <p:nvPr>
-            <p:ph type="title"/>
-          </p:nvPr>
-        </p:nvSpPr>
-        <p:spPr>
-          <a:xfrm>
-            <a:off x="457200" y="273050"/>
-            <a:ext cx="3008313" cy="1162050"/>
-          </a:xfrm>
-        </p:spPr>
-        <p:txBody>
-          <a:bodyPr anchor="b"/>
-          <a:lstStyle>
-            <a:lvl1pPr algn="l">
-              <a:defRPr sz="2000" b="1"/>
-            </a:lvl1pPr>
-          </a:lstStyle>
-          <a:p>
-            <a:r>
-              <a:rPr lang="en-US" smtClean="0"/>
-              <a:t>Click to edit Master title style</a:t>
-            </a:r>
-            <a:endParaRPr lang="en-US"/>
-          </a:p>
-        </p:txBody>
-      </p:sp>
-      <p:sp>
-        <p:nvSpPr>
-          <p:cNvPr id="3" name="Content Placeholder 2"/>
-          <p:cNvSpPr>
-            <a:spLocks noGrp="1"/>
-          </p:cNvSpPr>
-          <p:nvPr>
-            <p:ph idx="1"/>
-          </p:nvPr>
-        </p:nvSpPr>
-        <p:spPr>
-          <a:xfrm>
-            <a:off x="3575050" y="273050"/>
-            <a:ext cx="5111750" cy="5853113"/>
-          </a:xfrm>
-        </p:spPr>
-        <p:txBody>
-          <a:bodyPr/>
-          <a:lstStyle>
-            <a:lvl1pPr>
-              <a:defRPr sz="3200"/>
-            </a:lvl1pPr>
-            <a:lvl2pPr>
-              <a:defRPr sz="2800"/>
-            </a:lvl2pPr>
-            <a:lvl3pPr>
-              <a:defRPr sz="2400"/>
-            </a:lvl3pPr>
-            <a:lvl4pPr>
-              <a:defRPr sz="2000"/>
-            </a:lvl4pPr>
-            <a:lvl5pPr>
-              <a:defRPr sz="2000"/>
-            </a:lvl5pPr>
-            <a:lvl6pPr>
-              <a:defRPr sz="2000"/>
-            </a:lvl6pPr>
-            <a:lvl7pPr>
-              <a:defRPr sz="2000"/>
-            </a:lvl7pPr>
-            <a:lvl8pPr>
-              <a:defRPr sz="2000"/>
-            </a:lvl8pPr>
-            <a:lvl9pPr>
-              <a:defRPr sz="2000"/>
-            </a:lvl9pPr>
-          </a:lstStyle>
-          <a:p>
-            <a:pPr lvl="0"/>
-            <a:r>
-              <a:rPr lang="en-US" smtClean="0"/>
-              <a:t>Click to edit Master text styles</a:t>
-            </a:r>
-          </a:p>
-          <a:p>
-            <a:pPr lvl="1"/>
-            <a:r>
-              <a:rPr lang="en-US" smtClean="0"/>
-              <a:t>Second level</a:t>
-            </a:r>
-          </a:p>
-          <a:p>
-            <a:pPr lvl="2"/>
-            <a:r>
-              <a:rPr lang="en-US" smtClean="0"/>
-              <a:t>Third level</a:t>
-            </a:r>
-          </a:p>
-          <a:p>
-            <a:pPr lvl="3"/>
-            <a:r>
-              <a:rPr lang="en-US" smtClean="0"/>
-              <a:t>Fourth level</a:t>
-            </a:r>
-          </a:p>
-          <a:p>
-            <a:pPr lvl="4"/>
-            <a:r>
-              <a:rPr lang="en-US" smtClean="0"/>
-              <a:t>Fifth level</a:t>
-            </a:r>
-            <a:endParaRPr lang="en-US"/>
-          </a:p>
-        </p:txBody>
-      </p:sp>
-      <p:sp>
-        <p:nvSpPr>
-          <p:cNvPr id="4" name="Text Placeholder 3"/>
-          <p:cNvSpPr>
-            <a:spLocks noGrp="1"/>
-          </p:cNvSpPr>
-          <p:nvPr>
-            <p:ph type="body" sz="half" idx="2"/>
-          </p:nvPr>
-        </p:nvSpPr>
-        <p:spPr>
-          <a:xfrm>
-            <a:off x="457200" y="1435100"/>
-            <a:ext cx="3008313" cy="4691063"/>
-          </a:xfrm>
-        </p:spPr>
-        <p:txBody>
-          <a:bodyPr/>
-          <a:lstStyle>
-            <a:lvl1pPr marL="0" indent="0">
-              <a:buNone/>
-              <a:defRPr sz="1400"/>
-            </a:lvl1pPr>
-            <a:lvl2pPr marL="457200" indent="0">
-              <a:buNone/>
-              <a:defRPr sz="1200"/>
-            </a:lvl2pPr>
-            <a:lvl3pPr marL="914400" indent="0">
-              <a:buNone/>
-              <a:defRPr sz="1000"/>
-            </a:lvl3pPr>
-            <a:lvl4pPr marL="1371600" indent="0">
-              <a:buNone/>
-              <a:defRPr sz="900"/>
-            </a:lvl4pPr>
-            <a:lvl5pPr marL="1828800" indent="0">
-              <a:buNone/>
-              <a:defRPr sz="900"/>
-            </a:lvl5pPr>
-            <a:lvl6pPr marL="2286000" indent="0">
-              <a:buNone/>
-              <a:defRPr sz="900"/>
-            </a:lvl6pPr>
-            <a:lvl7pPr marL="2743200" indent="0">
-              <a:buNone/>
-              <a:defRPr sz="900"/>
-            </a:lvl7pPr>
-            <a:lvl8pPr marL="3200400" indent="0">
-              <a:buNone/>
-              <a:defRPr sz="900"/>
-            </a:lvl8pPr>
-            <a:lvl9pPr marL="3657600" indent="0">
-              <a:buNone/>
-              <a:defRPr sz="900"/>
-            </a:lvl9pPr>
-          </a:lstStyle>
-          <a:p>
-            <a:pPr lvl="0"/>
-            <a:r>
-              <a:rPr lang="en-US" smtClean="0"/>
-              <a:t>Click to edit Master text styles</a:t>
-            </a:r>
-          </a:p>
-        </p:txBody>
-      </p:sp>
-      <p:sp>
-        <p:nvSpPr>
-          <p:cNvPr id="5" name="Date Placeholder 4"/>
-          <p:cNvSpPr>
-            <a:spLocks noGrp="1"/>
-          </p:cNvSpPr>
-          <p:nvPr>
-            <p:ph type="dt" sz="half" idx="10"/>
-          </p:nvPr>
-        </p:nvSpPr>
-        <p:spPr/>
-        <p:txBody>
-          <a:bodyPr/>
-          <a:lstStyle/>
-          <a:p>
-            <a:fld id="{241EB5C9-1307-BA42-ABA2-0BC069CD8E7F}" type="datetimeFigureOut">
-              <a:rPr lang="en-US" smtClean="0"/>
-              <a:t>4/5/2019</a:t>
-            </a:fld>
-            <a:endParaRPr lang="en-US"/>
-          </a:p>
-        </p:txBody>
-      </p:sp>
-      <p:sp>
-        <p:nvSpPr>
-          <p:cNvPr id="6" name="Footer Placeholder 5"/>
-          <p:cNvSpPr>
-            <a:spLocks noGrp="1"/>
-          </p:cNvSpPr>
-          <p:nvPr>
-            <p:ph type="ftr" sz="quarter" idx="11"/>
-          </p:nvPr>
-        </p:nvSpPr>
-        <p:spPr/>
-        <p:txBody>
-          <a:bodyPr/>
-          <a:lstStyle/>
-          <a:p>
-            <a:endParaRPr lang="en-US"/>
-          </a:p>
-        </p:txBody>
-      </p:sp>
-      <p:sp>
-        <p:nvSpPr>
-          <p:cNvPr id="7" name="Slide Number Placeholder 6"/>
-          <p:cNvSpPr>
-            <a:spLocks noGrp="1"/>
-          </p:cNvSpPr>
-          <p:nvPr>
-            <p:ph type="sldNum" sz="quarter" idx="12"/>
-          </p:nvPr>
-        </p:nvSpPr>
-        <p:spPr/>
-        <p:txBody>
-          <a:bodyPr/>
-          <a:lstStyle/>
-          <a:p>
-            <a:fld id="{C5EF2332-01BF-834F-8236-50238282D533}" type="slidenum">
-              <a:rPr lang="en-US" smtClean="0"/>
-              <a:t>‹#›</a:t>
-            </a:fld>
-            <a:endParaRPr lang="en-US"/>
-          </a:p>
-        </p:txBody>
-      </p:sp>
-    </p:spTree>
-    <p:extLst>
-      <p:ext uri="{BB962C8B-B14F-4D97-AF65-F5344CB8AC3E}">
-        <p14:creationId xmlns:p14="http://schemas.microsoft.com/office/powerpoint/2010/main" val="3540895647"/>
-      </p:ext>
-    </p:extLst>
-  </p:cSld>
-  <p:clrMapOvr>
-    <a:masterClrMapping/>
-  </p:clrMapOvr>
-</p:sldLayout>
-</file>
-
-<file path=ppt/slideLayouts/slideLayout9.xml><?xml version="1.0" encoding="utf-8"?>
-<p:sldLayout xmlns:a="http://schemas.openxmlformats.org/drawingml/2006/main" xmlns:r="http://schemas.openxmlformats.org/officeDocument/2006/relationships" xmlns:p="http://schemas.openxmlformats.org/presentationml/2006/main" type="picTx" preserve="1">
-  <p:cSld name="Picture with Caption">
-    <p:spTree>
-      <p:nvGrpSpPr>
-        <p:cNvPr id="1" name=""/>
-        <p:cNvGrpSpPr/>
-        <p:nvPr/>
-      </p:nvGrpSpPr>
-      <p:grpSpPr>
-        <a:xfrm>
-          <a:off x="0" y="0"/>
-          <a:ext cx="0" cy="0"/>
-          <a:chOff x="0" y="0"/>
-          <a:chExt cx="0" cy="0"/>
-        </a:xfrm>
-      </p:grpSpPr>
-      <p:sp>
-        <p:nvSpPr>
-          <p:cNvPr id="2" name="Title 1"/>
-          <p:cNvSpPr>
-            <a:spLocks noGrp="1"/>
-          </p:cNvSpPr>
-          <p:nvPr>
-            <p:ph type="title"/>
-          </p:nvPr>
-        </p:nvSpPr>
-        <p:spPr>
-          <a:xfrm>
-            <a:off x="1792288" y="4800600"/>
-            <a:ext cx="5486400" cy="566738"/>
-          </a:xfrm>
-        </p:spPr>
-        <p:txBody>
-          <a:bodyPr anchor="b"/>
-          <a:lstStyle>
-            <a:lvl1pPr algn="l">
-              <a:defRPr sz="2000" b="1"/>
-            </a:lvl1pPr>
-          </a:lstStyle>
-          <a:p>
-            <a:r>
-              <a:rPr lang="en-US" smtClean="0"/>
-              <a:t>Click to edit Master title style</a:t>
-            </a:r>
-            <a:endParaRPr lang="en-US"/>
-          </a:p>
-        </p:txBody>
-      </p:sp>
-      <p:sp>
-        <p:nvSpPr>
-          <p:cNvPr id="3" name="Picture Placeholder 2"/>
-          <p:cNvSpPr>
-            <a:spLocks noGrp="1"/>
-          </p:cNvSpPr>
-          <p:nvPr>
-            <p:ph type="pic" idx="1"/>
-          </p:nvPr>
-        </p:nvSpPr>
-        <p:spPr>
-          <a:xfrm>
-            <a:off x="1792288" y="612775"/>
-            <a:ext cx="5486400" cy="4114800"/>
-          </a:xfrm>
-        </p:spPr>
-        <p:txBody>
-          <a:bodyPr/>
-          <a:lstStyle>
-            <a:lvl1pPr marL="0" indent="0">
-              <a:buNone/>
-              <a:defRPr sz="3200"/>
-            </a:lvl1pPr>
-            <a:lvl2pPr marL="457200" indent="0">
-              <a:buNone/>
-              <a:defRPr sz="2800"/>
-            </a:lvl2pPr>
-            <a:lvl3pPr marL="914400" indent="0">
-              <a:buNone/>
-              <a:defRPr sz="2400"/>
-            </a:lvl3pPr>
-            <a:lvl4pPr marL="1371600" indent="0">
-              <a:buNone/>
-              <a:defRPr sz="2000"/>
-            </a:lvl4pPr>
-            <a:lvl5pPr marL="1828800" indent="0">
-              <a:buNone/>
-              <a:defRPr sz="2000"/>
-            </a:lvl5pPr>
-            <a:lvl6pPr marL="2286000" indent="0">
-              <a:buNone/>
-              <a:defRPr sz="2000"/>
-            </a:lvl6pPr>
-            <a:lvl7pPr marL="2743200" indent="0">
-              <a:buNone/>
-              <a:defRPr sz="2000"/>
-            </a:lvl7pPr>
-            <a:lvl8pPr marL="3200400" indent="0">
-              <a:buNone/>
-              <a:defRPr sz="2000"/>
-            </a:lvl8pPr>
-            <a:lvl9pPr marL="3657600" indent="0">
-              <a:buNone/>
-              <a:defRPr sz="2000"/>
-            </a:lvl9pPr>
-          </a:lstStyle>
-          <a:p>
-            <a:endParaRPr lang="en-US"/>
-          </a:p>
-        </p:txBody>
-      </p:sp>
-      <p:sp>
-        <p:nvSpPr>
-          <p:cNvPr id="4" name="Text Placeholder 3"/>
-          <p:cNvSpPr>
-            <a:spLocks noGrp="1"/>
-          </p:cNvSpPr>
-          <p:nvPr>
-            <p:ph type="body" sz="half" idx="2"/>
-          </p:nvPr>
-        </p:nvSpPr>
-        <p:spPr>
-          <a:xfrm>
-            <a:off x="1792288" y="5367338"/>
-            <a:ext cx="5486400" cy="804862"/>
-          </a:xfrm>
-        </p:spPr>
-        <p:txBody>
-          <a:bodyPr/>
-          <a:lstStyle>
-            <a:lvl1pPr marL="0" indent="0">
-              <a:buNone/>
-              <a:defRPr sz="1400"/>
-            </a:lvl1pPr>
-            <a:lvl2pPr marL="457200" indent="0">
-              <a:buNone/>
-              <a:defRPr sz="1200"/>
-            </a:lvl2pPr>
-            <a:lvl3pPr marL="914400" indent="0">
-              <a:buNone/>
-              <a:defRPr sz="1000"/>
-            </a:lvl3pPr>
-            <a:lvl4pPr marL="1371600" indent="0">
-              <a:buNone/>
-              <a:defRPr sz="900"/>
-            </a:lvl4pPr>
-            <a:lvl5pPr marL="1828800" indent="0">
-              <a:buNone/>
-              <a:defRPr sz="900"/>
-            </a:lvl5pPr>
-            <a:lvl6pPr marL="2286000" indent="0">
-              <a:buNone/>
-              <a:defRPr sz="900"/>
-            </a:lvl6pPr>
-            <a:lvl7pPr marL="2743200" indent="0">
-              <a:buNone/>
-              <a:defRPr sz="900"/>
-            </a:lvl7pPr>
-            <a:lvl8pPr marL="3200400" indent="0">
-              <a:buNone/>
-              <a:defRPr sz="900"/>
-            </a:lvl8pPr>
-            <a:lvl9pPr marL="3657600" indent="0">
-              <a:buNone/>
-              <a:defRPr sz="900"/>
-            </a:lvl9pPr>
-          </a:lstStyle>
-          <a:p>
-            <a:pPr lvl="0"/>
-            <a:r>
-              <a:rPr lang="en-US" smtClean="0"/>
-              <a:t>Click to edit Master text styles</a:t>
-            </a:r>
-          </a:p>
-        </p:txBody>
-      </p:sp>
-      <p:sp>
-        <p:nvSpPr>
-          <p:cNvPr id="5" name="Date Placeholder 4"/>
-          <p:cNvSpPr>
-            <a:spLocks noGrp="1"/>
-          </p:cNvSpPr>
-          <p:nvPr>
-            <p:ph type="dt" sz="half" idx="10"/>
-          </p:nvPr>
-        </p:nvSpPr>
-        <p:spPr/>
-        <p:txBody>
-          <a:bodyPr/>
-          <a:lstStyle/>
-          <a:p>
-            <a:fld id="{241EB5C9-1307-BA42-ABA2-0BC069CD8E7F}" type="datetimeFigureOut">
-              <a:rPr lang="en-US" smtClean="0"/>
-              <a:t>4/5/2019</a:t>
-            </a:fld>
-            <a:endParaRPr lang="en-US"/>
-          </a:p>
-        </p:txBody>
-      </p:sp>
-      <p:sp>
-        <p:nvSpPr>
-          <p:cNvPr id="6" name="Footer Placeholder 5"/>
-          <p:cNvSpPr>
-            <a:spLocks noGrp="1"/>
-          </p:cNvSpPr>
-          <p:nvPr>
-            <p:ph type="ftr" sz="quarter" idx="11"/>
-          </p:nvPr>
-        </p:nvSpPr>
-        <p:spPr/>
-        <p:txBody>
-          <a:bodyPr/>
-          <a:lstStyle/>
-          <a:p>
-            <a:endParaRPr lang="en-US"/>
-          </a:p>
-        </p:txBody>
-      </p:sp>
-      <p:sp>
-        <p:nvSpPr>
-          <p:cNvPr id="7" name="Slide Number Placeholder 6"/>
-          <p:cNvSpPr>
-            <a:spLocks noGrp="1"/>
-          </p:cNvSpPr>
-          <p:nvPr>
-            <p:ph type="sldNum" sz="quarter" idx="12"/>
-          </p:nvPr>
-        </p:nvSpPr>
-        <p:spPr/>
-        <p:txBody>
-          <a:bodyPr/>
-          <a:lstStyle/>
-          <a:p>
-            <a:fld id="{C5EF2332-01BF-834F-8236-50238282D533}" type="slidenum">
-              <a:rPr lang="en-US" smtClean="0"/>
-              <a:t>‹#›</a:t>
-            </a:fld>
-            <a:endParaRPr lang="en-US"/>
-          </a:p>
-        </p:txBody>
-      </p:sp>
-    </p:spTree>
-    <p:extLst>
-      <p:ext uri="{BB962C8B-B14F-4D97-AF65-F5344CB8AC3E}">
-        <p14:creationId xmlns:p14="http://schemas.microsoft.com/office/powerpoint/2010/main" val="3566899855"/>
-      </p:ext>
-    </p:extLst>
-  </p:cSld>
-  <p:clrMapOvr>
-    <a:masterClrMapping/>
   </p:clrMapOvr>
 </p:sldLayout>
 </file>
@@ -3182,7 +1668,7 @@
           <a:p>
             <a:fld id="{5EF76A7A-0506-6C4D-8382-BFC753915B9A}" type="datetime4">
               <a:rPr lang="en-US" smtClean="0"/>
-              <a:t>December 12, 2020</a:t>
+              <a:t>December 13, 2020</a:t>
             </a:fld>
             <a:endParaRPr lang="en-US" dirty="0"/>
           </a:p>
@@ -3636,28 +2122,11 @@
           <a:bodyPr/>
           <a:lstStyle/>
           <a:p>
-            <a:pPr lvl="0" marL="0" indent="0">
+            <a:pPr marL="0" lvl="0" indent="0">
               <a:buNone/>
             </a:pPr>
             <a:r>
-              <a:rPr/>
-              <a:t>SamplePPT</a:t>
-            </a:r>
-            <a:r>
-              <a:rPr/>
-              <a:t> </a:t>
-            </a:r>
-            <a:r>
-              <a:rPr/>
-              <a:t>(PERSI</a:t>
-            </a:r>
-            <a:r>
-              <a:rPr/>
-              <a:t> </a:t>
-            </a:r>
-            <a:r>
-              <a:rPr/>
-              <a:t>graphs)</a:t>
+              <a:t>SamplePPT (PERSI graphs)</a:t>
             </a:r>
           </a:p>
         </p:txBody>
@@ -3682,46 +2151,13 @@
           <a:bodyPr/>
           <a:lstStyle/>
           <a:p>
-            <a:pPr lvl="0" marL="0" indent="0">
+            <a:pPr marL="0" lvl="0" indent="0">
               <a:buNone/>
             </a:pPr>
             <a:br/>
             <a:br/>
             <a:r>
-              <a:rPr/>
-              <a:t>Anil,</a:t>
-            </a:r>
-            <a:r>
-              <a:rPr/>
-              <a:t> </a:t>
-            </a:r>
-            <a:r>
-              <a:rPr/>
-              <a:t>Swaroop,</a:t>
-            </a:r>
-            <a:r>
-              <a:rPr/>
-              <a:t> </a:t>
-            </a:r>
-            <a:r>
-              <a:rPr/>
-              <a:t>Jen</a:t>
-            </a:r>
-            <a:r>
-              <a:rPr/>
-              <a:t> </a:t>
-            </a:r>
-            <a:r>
-              <a:rPr/>
-              <a:t>&amp;</a:t>
-            </a:r>
-            <a:r>
-              <a:rPr/>
-              <a:t> </a:t>
-            </a:r>
-            <a:r>
-              <a:rPr/>
-              <a:t>Jordan</a:t>
+              <a:t>Anil, Swaroop, Jen &amp; Jordan</a:t>
             </a:r>
           </a:p>
         </p:txBody>
@@ -3741,11 +2177,10 @@
           <a:bodyPr/>
           <a:lstStyle/>
           <a:p>
-            <a:pPr lvl="0" marL="0" indent="0">
+            <a:pPr marL="0" lvl="0" indent="0">
               <a:buNone/>
             </a:pPr>
             <a:r>
-              <a:rPr/>
               <a:t>12/12/2020</a:t>
             </a:r>
           </a:p>
@@ -3753,6 +2188,9 @@
       </p:sp>
     </p:spTree>
   </p:cSld>
+  <p:clrMapOvr>
+    <a:masterClrMapping/>
+  </p:clrMapOvr>
 </p:sld>
 </file>
 
@@ -3796,83 +2234,18 @@
           <a:bodyPr/>
           <a:lstStyle/>
           <a:p>
-            <a:pPr lvl="0" marL="0" indent="0">
+            <a:pPr marL="0" lvl="0" indent="0">
               <a:buNone/>
             </a:pPr>
             <a:r>
-              <a:rPr/>
-              <a:t>A</a:t>
-            </a:r>
-            <a:r>
-              <a:rPr/>
-              <a:t> </a:t>
-            </a:r>
-            <a:r>
-              <a:rPr/>
-              <a:t>History</a:t>
-            </a:r>
-            <a:r>
-              <a:rPr/>
-              <a:t> </a:t>
-            </a:r>
-            <a:r>
-              <a:rPr/>
-              <a:t>of</a:t>
-            </a:r>
-            <a:r>
-              <a:rPr/>
-              <a:t> </a:t>
-            </a:r>
-            <a:r>
-              <a:rPr/>
-              <a:t>Weakening</a:t>
-            </a:r>
-            <a:r>
-              <a:rPr/>
-              <a:t> </a:t>
-            </a:r>
-            <a:r>
-              <a:rPr/>
-              <a:t>Solvency</a:t>
-            </a:r>
-            <a:r>
-              <a:rPr/>
-              <a:t> </a:t>
-            </a:r>
-            <a:r>
-              <a:rPr/>
-              <a:t>(2001-2019)</a:t>
-            </a:r>
-            <a:r>
-              <a:rPr/>
-              <a:t> </a:t>
-            </a:r>
-            <a:r>
-              <a:rPr/>
-              <a:t>w/</a:t>
-            </a:r>
-            <a:r>
-              <a:rPr/>
-              <a:t> </a:t>
-            </a:r>
-            <a:r>
-              <a:rPr/>
-              <a:t>R</a:t>
-            </a:r>
-            <a:r>
-              <a:rPr/>
-              <a:t> </a:t>
-            </a:r>
-            <a:r>
-              <a:rPr/>
-              <a:t>(debtPlot())</a:t>
+              <a:t>A History of Weakening Solvency (2001-2019) w/ R (areaPlot())</a:t>
             </a:r>
           </a:p>
         </p:txBody>
       </p:sp>
       <p:pic>
         <p:nvPicPr>
-          <p:cNvPr descr="SamplePPT_files/figure-pptx/debt-1.png" id="0" name="Picture 1"/>
+          <p:cNvPr id="3" name="Picture 1" descr="SamplePPT_files/figure-pptx/debt-1.png"/>
           <p:cNvPicPr>
             <a:picLocks noGrp="1" noChangeAspect="1"/>
           </p:cNvPicPr>
@@ -3902,6 +2275,9 @@
       </p:pic>
     </p:spTree>
   </p:cSld>
+  <p:clrMapOvr>
+    <a:masterClrMapping/>
+  </p:clrMapOvr>
 </p:sld>
 </file>
 
@@ -3945,83 +2321,18 @@
           <a:bodyPr/>
           <a:lstStyle/>
           <a:p>
-            <a:pPr lvl="0" marL="0" indent="0">
+            <a:pPr marL="0" lvl="0" indent="0">
               <a:buNone/>
             </a:pPr>
             <a:r>
-              <a:rPr/>
-              <a:t>A</a:t>
-            </a:r>
-            <a:r>
-              <a:rPr/>
-              <a:t> </a:t>
-            </a:r>
-            <a:r>
-              <a:rPr/>
-              <a:t>History</a:t>
-            </a:r>
-            <a:r>
-              <a:rPr/>
-              <a:t> </a:t>
-            </a:r>
-            <a:r>
-              <a:rPr/>
-              <a:t>of</a:t>
-            </a:r>
-            <a:r>
-              <a:rPr/>
-              <a:t> </a:t>
-            </a:r>
-            <a:r>
-              <a:rPr/>
-              <a:t>Investment</a:t>
-            </a:r>
-            <a:r>
-              <a:rPr/>
-              <a:t> </a:t>
-            </a:r>
-            <a:r>
-              <a:rPr/>
-              <a:t>Returns</a:t>
-            </a:r>
-            <a:r>
-              <a:rPr/>
-              <a:t> </a:t>
-            </a:r>
-            <a:r>
-              <a:rPr/>
-              <a:t>(2001-2019)</a:t>
-            </a:r>
-            <a:r>
-              <a:rPr/>
-              <a:t> </a:t>
-            </a:r>
-            <a:r>
-              <a:rPr/>
-              <a:t>w/</a:t>
-            </a:r>
-            <a:r>
-              <a:rPr/>
-              <a:t> </a:t>
-            </a:r>
-            <a:r>
-              <a:rPr/>
-              <a:t>R</a:t>
-            </a:r>
-            <a:r>
-              <a:rPr/>
-              <a:t> </a:t>
-            </a:r>
-            <a:r>
-              <a:rPr/>
-              <a:t>(linePlot())</a:t>
+              <a:t>A History of Investment Returns (2001-2019) w/ R (linePlot())</a:t>
             </a:r>
           </a:p>
         </p:txBody>
       </p:sp>
       <p:pic>
         <p:nvPicPr>
-          <p:cNvPr descr="SamplePPT_files/figure-pptx/graph-1.png" id="0" name="Picture 1"/>
+          <p:cNvPr id="3" name="Picture 1" descr="SamplePPT_files/figure-pptx/graph-1.png"/>
           <p:cNvPicPr>
             <a:picLocks noGrp="1" noChangeAspect="1"/>
           </p:cNvPicPr>
@@ -4051,6 +2362,9 @@
       </p:pic>
     </p:spTree>
   </p:cSld>
+  <p:clrMapOvr>
+    <a:masterClrMapping/>
+  </p:clrMapOvr>
 </p:sld>
 </file>
 
@@ -4094,51 +2408,27 @@
           <a:bodyPr/>
           <a:lstStyle/>
           <a:p>
-            <a:pPr lvl="0" marL="0" indent="0">
+            <a:pPr marL="0" lvl="0" indent="0">
               <a:buNone/>
             </a:pPr>
             <a:r>
-              <a:rPr/>
-              <a:t>Asset</a:t>
-            </a:r>
-            <a:r>
-              <a:rPr/>
-              <a:t> </a:t>
-            </a:r>
-            <a:r>
-              <a:rPr/>
-              <a:t>Allocation</a:t>
-            </a:r>
-            <a:r>
-              <a:rPr/>
-              <a:t> </a:t>
-            </a:r>
-            <a:r>
-              <a:rPr/>
-              <a:t>w/</a:t>
-            </a:r>
-            <a:r>
-              <a:rPr/>
-              <a:t> </a:t>
-            </a:r>
-            <a:r>
-              <a:rPr/>
-              <a:t>R</a:t>
-            </a:r>
-            <a:r>
-              <a:rPr/>
-              <a:t> </a:t>
-            </a:r>
-            <a:r>
-              <a:rPr/>
-              <a:t>(custom)</a:t>
+              <a:rPr dirty="0"/>
+              <a:t>S&amp;P500 vs. Funded Ratio (2001-2019) w/ R (</a:t>
+            </a:r>
+            <a:r>
+              <a:rPr dirty="0" err="1"/>
+              <a:t>areaPlot</a:t>
+            </a:r>
+            <a:r>
+              <a:rPr dirty="0"/>
+              <a:t>())</a:t>
             </a:r>
           </a:p>
         </p:txBody>
       </p:sp>
       <p:pic>
         <p:nvPicPr>
-          <p:cNvPr descr="SamplePPT_files/figure-pptx/assets-1.png" id="0" name="Picture 1"/>
+          <p:cNvPr id="3" name="Picture 1" descr="SamplePPT_files/figure-pptx/sp500-1.png"/>
           <p:cNvPicPr>
             <a:picLocks noGrp="1" noChangeAspect="1"/>
           </p:cNvPicPr>
@@ -4168,6 +2458,9 @@
       </p:pic>
     </p:spTree>
   </p:cSld>
+  <p:clrMapOvr>
+    <a:masterClrMapping/>
+  </p:clrMapOvr>
 </p:sld>
 </file>
 
@@ -4211,59 +2504,18 @@
           <a:bodyPr/>
           <a:lstStyle/>
           <a:p>
-            <a:pPr lvl="0" marL="0" indent="0">
+            <a:pPr marL="0" lvl="0" indent="0">
               <a:buNone/>
             </a:pPr>
             <a:r>
-              <a:rPr/>
-              <a:t>Negative</a:t>
-            </a:r>
-            <a:r>
-              <a:rPr/>
-              <a:t> </a:t>
-            </a:r>
-            <a:r>
-              <a:rPr/>
-              <a:t>Amortization</a:t>
-            </a:r>
-            <a:r>
-              <a:rPr/>
-              <a:t> </a:t>
-            </a:r>
-            <a:r>
-              <a:rPr/>
-              <a:t>Growth</a:t>
-            </a:r>
-            <a:r>
-              <a:rPr/>
-              <a:t> </a:t>
-            </a:r>
-            <a:r>
-              <a:rPr/>
-              <a:t>w/</a:t>
-            </a:r>
-            <a:r>
-              <a:rPr/>
-              <a:t> </a:t>
-            </a:r>
-            <a:r>
-              <a:rPr/>
-              <a:t>R</a:t>
-            </a:r>
-            <a:r>
-              <a:rPr/>
-              <a:t> </a:t>
-            </a:r>
-            <a:r>
-              <a:rPr/>
-              <a:t>(custom)</a:t>
+              <a:t>Asset Allocation w/ R (custom)</a:t>
             </a:r>
           </a:p>
         </p:txBody>
       </p:sp>
       <p:pic>
         <p:nvPicPr>
-          <p:cNvPr descr="SamplePPT_files/figure-pptx/neg.amo-1.png" id="0" name="Picture 1"/>
+          <p:cNvPr id="3" name="Picture 1" descr="SamplePPT_files/figure-pptx/assets-1.png"/>
           <p:cNvPicPr>
             <a:picLocks noGrp="1" noChangeAspect="1"/>
           </p:cNvPicPr>
@@ -4293,6 +2545,9 @@
       </p:pic>
     </p:spTree>
   </p:cSld>
+  <p:clrMapOvr>
+    <a:masterClrMapping/>
+  </p:clrMapOvr>
 </p:sld>
 </file>
 
@@ -4336,11 +2591,97 @@
           <a:bodyPr/>
           <a:lstStyle/>
           <a:p>
-            <a:pPr lvl="0" marL="0" indent="0">
+            <a:pPr marL="0" lvl="0" indent="0">
               <a:buNone/>
             </a:pPr>
             <a:r>
-              <a:rPr/>
+              <a:t>Negative Amortization Growth w/ R (custom)</a:t>
+            </a:r>
+          </a:p>
+        </p:txBody>
+      </p:sp>
+      <p:pic>
+        <p:nvPicPr>
+          <p:cNvPr id="3" name="Picture 1" descr="SamplePPT_files/figure-pptx/neg.amo-1.png"/>
+          <p:cNvPicPr>
+            <a:picLocks noGrp="1" noChangeAspect="1"/>
+          </p:cNvPicPr>
+          <p:nvPr/>
+        </p:nvPicPr>
+        <p:blipFill>
+          <a:blip r:embed="rId2"/>
+          <a:stretch>
+            <a:fillRect/>
+          </a:stretch>
+        </p:blipFill>
+        <p:spPr bwMode="auto">
+          <a:xfrm>
+            <a:off x="673100" y="1600200"/>
+            <a:ext cx="7797800" cy="4876800"/>
+          </a:xfrm>
+          <a:prstGeom prst="rect">
+            <a:avLst/>
+          </a:prstGeom>
+          <a:noFill/>
+          <a:ln w="9525">
+            <a:noFill/>
+            <a:headEnd/>
+            <a:tailEnd/>
+          </a:ln>
+        </p:spPr>
+      </p:pic>
+    </p:spTree>
+  </p:cSld>
+  <p:clrMapOvr>
+    <a:masterClrMapping/>
+  </p:clrMapOvr>
+</p:sld>
+</file>
+
+<file path=ppt/slides/slide7.xml><?xml version="1.0" encoding="utf-8"?>
+<p:sld xmlns:a="http://schemas.openxmlformats.org/drawingml/2006/main" xmlns:r="http://schemas.openxmlformats.org/officeDocument/2006/relationships" xmlns:p="http://schemas.openxmlformats.org/presentationml/2006/main">
+  <p:cSld>
+    <p:spTree>
+      <p:nvGrpSpPr>
+        <p:cNvPr id="1" name=""/>
+        <p:cNvGrpSpPr/>
+        <p:nvPr/>
+      </p:nvGrpSpPr>
+      <p:grpSpPr>
+        <a:xfrm>
+          <a:off x="0" y="0"/>
+          <a:ext cx="0" cy="0"/>
+          <a:chOff x="0" y="0"/>
+          <a:chExt cx="0" cy="0"/>
+        </a:xfrm>
+      </p:grpSpPr>
+      <p:sp>
+        <p:nvSpPr>
+          <p:cNvPr id="2" name="Title 1"/>
+          <p:cNvSpPr>
+            <a:spLocks noGrp="1"/>
+          </p:cNvSpPr>
+          <p:nvPr>
+            <p:ph type="title" hasCustomPrompt="1"/>
+          </p:nvPr>
+        </p:nvSpPr>
+        <p:spPr>
+          <a:xfrm>
+            <a:off x="457200" y="533400"/>
+            <a:ext cx="7864475" cy="990600"/>
+          </a:xfrm>
+          <a:prstGeom prst="rect">
+            <a:avLst/>
+          </a:prstGeom>
+        </p:spPr>
+        <p:txBody>
+          <a:bodyPr/>
+          <a:lstStyle/>
+          <a:p>
+            <a:pPr marL="0" lvl="0" indent="0">
+              <a:buNone/>
+            </a:pPr>
+            <a:r>
               <a:t>References</a:t>
             </a:r>
           </a:p>
@@ -4391,6 +2732,9 @@
       </p:sp>
     </p:spTree>
   </p:cSld>
+  <p:clrMapOvr>
+    <a:masterClrMapping/>
+  </p:clrMapOvr>
 </p:sld>
 </file>
 

</xml_diff>

<commit_message>
Added areaPlot to `pensionviewr` and condensed the SamplePPT syntax
</commit_message>
<xml_diff>
--- a/DeckUpdate/SamplePPT.pptx
+++ b/DeckUpdate/SamplePPT.pptx
@@ -361,7 +361,7 @@
           <a:p>
             <a:fld id="{10302D39-B686-2742-A69B-CE6D46FC9A4E}" type="datetime4">
               <a:rPr lang="en-US" smtClean="0"/>
-              <a:t>December 12, 2020</a:t>
+              <a:t>December 19, 2020</a:t>
             </a:fld>
             <a:endParaRPr lang="en-US" dirty="0"/>
           </a:p>
@@ -483,356 +483,6 @@
 </p:sldLayout>
 </file>
 
-<file path=ppt/slideLayouts/slideLayout10.xml><?xml version="1.0" encoding="utf-8"?>
-<p:sldLayout xmlns:a="http://schemas.openxmlformats.org/drawingml/2006/main" xmlns:r="http://schemas.openxmlformats.org/officeDocument/2006/relationships" xmlns:p="http://schemas.openxmlformats.org/presentationml/2006/main" type="vertTx" preserve="1">
-  <p:cSld name="Title and Vertical Text">
-    <p:spTree>
-      <p:nvGrpSpPr>
-        <p:cNvPr id="1" name=""/>
-        <p:cNvGrpSpPr/>
-        <p:nvPr/>
-      </p:nvGrpSpPr>
-      <p:grpSpPr>
-        <a:xfrm>
-          <a:off x="0" y="0"/>
-          <a:ext cx="0" cy="0"/>
-          <a:chOff x="0" y="0"/>
-          <a:chExt cx="0" cy="0"/>
-        </a:xfrm>
-      </p:grpSpPr>
-      <p:sp>
-        <p:nvSpPr>
-          <p:cNvPr id="2" name="Title 1"/>
-          <p:cNvSpPr>
-            <a:spLocks noGrp="1"/>
-          </p:cNvSpPr>
-          <p:nvPr>
-            <p:ph type="title"/>
-          </p:nvPr>
-        </p:nvSpPr>
-        <p:spPr/>
-        <p:txBody>
-          <a:bodyPr/>
-          <a:lstStyle/>
-          <a:p>
-            <a:r>
-              <a:rPr lang="en-US" smtClean="0"/>
-              <a:t>Click to edit Master title style</a:t>
-            </a:r>
-            <a:endParaRPr lang="en-US"/>
-          </a:p>
-        </p:txBody>
-      </p:sp>
-      <p:sp>
-        <p:nvSpPr>
-          <p:cNvPr id="3" name="Vertical Text Placeholder 2"/>
-          <p:cNvSpPr>
-            <a:spLocks noGrp="1"/>
-          </p:cNvSpPr>
-          <p:nvPr>
-            <p:ph type="body" orient="vert" idx="1"/>
-          </p:nvPr>
-        </p:nvSpPr>
-        <p:spPr/>
-        <p:txBody>
-          <a:bodyPr vert="eaVert"/>
-          <a:lstStyle/>
-          <a:p>
-            <a:pPr lvl="0"/>
-            <a:r>
-              <a:rPr lang="en-US" smtClean="0"/>
-              <a:t>Click to edit Master text styles</a:t>
-            </a:r>
-          </a:p>
-          <a:p>
-            <a:pPr lvl="1"/>
-            <a:r>
-              <a:rPr lang="en-US" smtClean="0"/>
-              <a:t>Second level</a:t>
-            </a:r>
-          </a:p>
-          <a:p>
-            <a:pPr lvl="2"/>
-            <a:r>
-              <a:rPr lang="en-US" smtClean="0"/>
-              <a:t>Third level</a:t>
-            </a:r>
-          </a:p>
-          <a:p>
-            <a:pPr lvl="3"/>
-            <a:r>
-              <a:rPr lang="en-US" smtClean="0"/>
-              <a:t>Fourth level</a:t>
-            </a:r>
-          </a:p>
-          <a:p>
-            <a:pPr lvl="4"/>
-            <a:r>
-              <a:rPr lang="en-US" smtClean="0"/>
-              <a:t>Fifth level</a:t>
-            </a:r>
-            <a:endParaRPr lang="en-US"/>
-          </a:p>
-        </p:txBody>
-      </p:sp>
-      <p:sp>
-        <p:nvSpPr>
-          <p:cNvPr id="4" name="Date Placeholder 3"/>
-          <p:cNvSpPr>
-            <a:spLocks noGrp="1"/>
-          </p:cNvSpPr>
-          <p:nvPr>
-            <p:ph type="dt" sz="half" idx="10"/>
-          </p:nvPr>
-        </p:nvSpPr>
-        <p:spPr/>
-        <p:txBody>
-          <a:bodyPr/>
-          <a:lstStyle/>
-          <a:p>
-            <a:fld id="{241EB5C9-1307-BA42-ABA2-0BC069CD8E7F}" type="datetimeFigureOut">
-              <a:rPr lang="en-US" smtClean="0"/>
-              <a:t>4/5/2019</a:t>
-            </a:fld>
-            <a:endParaRPr lang="en-US"/>
-          </a:p>
-        </p:txBody>
-      </p:sp>
-      <p:sp>
-        <p:nvSpPr>
-          <p:cNvPr id="5" name="Footer Placeholder 4"/>
-          <p:cNvSpPr>
-            <a:spLocks noGrp="1"/>
-          </p:cNvSpPr>
-          <p:nvPr>
-            <p:ph type="ftr" sz="quarter" idx="11"/>
-          </p:nvPr>
-        </p:nvSpPr>
-        <p:spPr/>
-        <p:txBody>
-          <a:bodyPr/>
-          <a:lstStyle/>
-          <a:p>
-            <a:endParaRPr lang="en-US"/>
-          </a:p>
-        </p:txBody>
-      </p:sp>
-      <p:sp>
-        <p:nvSpPr>
-          <p:cNvPr id="6" name="Slide Number Placeholder 5"/>
-          <p:cNvSpPr>
-            <a:spLocks noGrp="1"/>
-          </p:cNvSpPr>
-          <p:nvPr>
-            <p:ph type="sldNum" sz="quarter" idx="12"/>
-          </p:nvPr>
-        </p:nvSpPr>
-        <p:spPr/>
-        <p:txBody>
-          <a:bodyPr/>
-          <a:lstStyle/>
-          <a:p>
-            <a:fld id="{C5EF2332-01BF-834F-8236-50238282D533}" type="slidenum">
-              <a:rPr lang="en-US" smtClean="0"/>
-              <a:t>‹#›</a:t>
-            </a:fld>
-            <a:endParaRPr lang="en-US"/>
-          </a:p>
-        </p:txBody>
-      </p:sp>
-    </p:spTree>
-    <p:extLst>
-      <p:ext uri="{BB962C8B-B14F-4D97-AF65-F5344CB8AC3E}">
-        <p14:creationId xmlns:p14="http://schemas.microsoft.com/office/powerpoint/2010/main" val="313914798"/>
-      </p:ext>
-    </p:extLst>
-  </p:cSld>
-  <p:clrMapOvr>
-    <a:masterClrMapping/>
-  </p:clrMapOvr>
-</p:sldLayout>
-</file>
-
-<file path=ppt/slideLayouts/slideLayout11.xml><?xml version="1.0" encoding="utf-8"?>
-<p:sldLayout xmlns:a="http://schemas.openxmlformats.org/drawingml/2006/main" xmlns:r="http://schemas.openxmlformats.org/officeDocument/2006/relationships" xmlns:p="http://schemas.openxmlformats.org/presentationml/2006/main" type="vertTitleAndTx" preserve="1">
-  <p:cSld name="Vertical Title and Text">
-    <p:spTree>
-      <p:nvGrpSpPr>
-        <p:cNvPr id="1" name=""/>
-        <p:cNvGrpSpPr/>
-        <p:nvPr/>
-      </p:nvGrpSpPr>
-      <p:grpSpPr>
-        <a:xfrm>
-          <a:off x="0" y="0"/>
-          <a:ext cx="0" cy="0"/>
-          <a:chOff x="0" y="0"/>
-          <a:chExt cx="0" cy="0"/>
-        </a:xfrm>
-      </p:grpSpPr>
-      <p:sp>
-        <p:nvSpPr>
-          <p:cNvPr id="2" name="Vertical Title 1"/>
-          <p:cNvSpPr>
-            <a:spLocks noGrp="1"/>
-          </p:cNvSpPr>
-          <p:nvPr>
-            <p:ph type="title" orient="vert"/>
-          </p:nvPr>
-        </p:nvSpPr>
-        <p:spPr>
-          <a:xfrm>
-            <a:off x="6629400" y="274638"/>
-            <a:ext cx="2057400" cy="5851525"/>
-          </a:xfrm>
-        </p:spPr>
-        <p:txBody>
-          <a:bodyPr vert="eaVert"/>
-          <a:lstStyle/>
-          <a:p>
-            <a:r>
-              <a:rPr lang="en-US" smtClean="0"/>
-              <a:t>Click to edit Master title style</a:t>
-            </a:r>
-            <a:endParaRPr lang="en-US"/>
-          </a:p>
-        </p:txBody>
-      </p:sp>
-      <p:sp>
-        <p:nvSpPr>
-          <p:cNvPr id="3" name="Vertical Text Placeholder 2"/>
-          <p:cNvSpPr>
-            <a:spLocks noGrp="1"/>
-          </p:cNvSpPr>
-          <p:nvPr>
-            <p:ph type="body" orient="vert" idx="1"/>
-          </p:nvPr>
-        </p:nvSpPr>
-        <p:spPr>
-          <a:xfrm>
-            <a:off x="457200" y="274638"/>
-            <a:ext cx="6019800" cy="5851525"/>
-          </a:xfrm>
-        </p:spPr>
-        <p:txBody>
-          <a:bodyPr vert="eaVert"/>
-          <a:lstStyle/>
-          <a:p>
-            <a:pPr lvl="0"/>
-            <a:r>
-              <a:rPr lang="en-US" smtClean="0"/>
-              <a:t>Click to edit Master text styles</a:t>
-            </a:r>
-          </a:p>
-          <a:p>
-            <a:pPr lvl="1"/>
-            <a:r>
-              <a:rPr lang="en-US" smtClean="0"/>
-              <a:t>Second level</a:t>
-            </a:r>
-          </a:p>
-          <a:p>
-            <a:pPr lvl="2"/>
-            <a:r>
-              <a:rPr lang="en-US" smtClean="0"/>
-              <a:t>Third level</a:t>
-            </a:r>
-          </a:p>
-          <a:p>
-            <a:pPr lvl="3"/>
-            <a:r>
-              <a:rPr lang="en-US" smtClean="0"/>
-              <a:t>Fourth level</a:t>
-            </a:r>
-          </a:p>
-          <a:p>
-            <a:pPr lvl="4"/>
-            <a:r>
-              <a:rPr lang="en-US" smtClean="0"/>
-              <a:t>Fifth level</a:t>
-            </a:r>
-            <a:endParaRPr lang="en-US"/>
-          </a:p>
-        </p:txBody>
-      </p:sp>
-      <p:sp>
-        <p:nvSpPr>
-          <p:cNvPr id="4" name="Date Placeholder 3"/>
-          <p:cNvSpPr>
-            <a:spLocks noGrp="1"/>
-          </p:cNvSpPr>
-          <p:nvPr>
-            <p:ph type="dt" sz="half" idx="10"/>
-          </p:nvPr>
-        </p:nvSpPr>
-        <p:spPr/>
-        <p:txBody>
-          <a:bodyPr/>
-          <a:lstStyle/>
-          <a:p>
-            <a:fld id="{241EB5C9-1307-BA42-ABA2-0BC069CD8E7F}" type="datetimeFigureOut">
-              <a:rPr lang="en-US" smtClean="0"/>
-              <a:t>4/5/2019</a:t>
-            </a:fld>
-            <a:endParaRPr lang="en-US"/>
-          </a:p>
-        </p:txBody>
-      </p:sp>
-      <p:sp>
-        <p:nvSpPr>
-          <p:cNvPr id="5" name="Footer Placeholder 4"/>
-          <p:cNvSpPr>
-            <a:spLocks noGrp="1"/>
-          </p:cNvSpPr>
-          <p:nvPr>
-            <p:ph type="ftr" sz="quarter" idx="11"/>
-          </p:nvPr>
-        </p:nvSpPr>
-        <p:spPr/>
-        <p:txBody>
-          <a:bodyPr/>
-          <a:lstStyle/>
-          <a:p>
-            <a:endParaRPr lang="en-US"/>
-          </a:p>
-        </p:txBody>
-      </p:sp>
-      <p:sp>
-        <p:nvSpPr>
-          <p:cNvPr id="6" name="Slide Number Placeholder 5"/>
-          <p:cNvSpPr>
-            <a:spLocks noGrp="1"/>
-          </p:cNvSpPr>
-          <p:nvPr>
-            <p:ph type="sldNum" sz="quarter" idx="12"/>
-          </p:nvPr>
-        </p:nvSpPr>
-        <p:spPr/>
-        <p:txBody>
-          <a:bodyPr/>
-          <a:lstStyle/>
-          <a:p>
-            <a:fld id="{C5EF2332-01BF-834F-8236-50238282D533}" type="slidenum">
-              <a:rPr lang="en-US" smtClean="0"/>
-              <a:t>‹#›</a:t>
-            </a:fld>
-            <a:endParaRPr lang="en-US"/>
-          </a:p>
-        </p:txBody>
-      </p:sp>
-    </p:spTree>
-    <p:extLst>
-      <p:ext uri="{BB962C8B-B14F-4D97-AF65-F5344CB8AC3E}">
-        <p14:creationId xmlns:p14="http://schemas.microsoft.com/office/powerpoint/2010/main" val="2581529045"/>
-      </p:ext>
-    </p:extLst>
-  </p:cSld>
-  <p:clrMapOvr>
-    <a:masterClrMapping/>
-  </p:clrMapOvr>
-</p:sldLayout>
-</file>
-
 <file path=ppt/slideLayouts/slideLayout2.xml><?xml version="1.0" encoding="utf-8"?>
 <p:sldLayout xmlns:a="http://schemas.openxmlformats.org/drawingml/2006/main" xmlns:r="http://schemas.openxmlformats.org/officeDocument/2006/relationships" xmlns:p="http://schemas.openxmlformats.org/presentationml/2006/main" preserve="1" userDrawn="1">
   <p:cSld name="Content (Text &amp; Graph)">
@@ -1032,7 +682,7 @@
           <a:p>
             <a:fld id="{585AD263-A788-3145-8D38-AEBC1D444AEE}" type="datetime4">
               <a:rPr lang="en-US" smtClean="0"/>
-              <a:t>December 12, 2020</a:t>
+              <a:t>December 19, 2020</a:t>
             </a:fld>
             <a:endParaRPr lang="en-US" dirty="0"/>
           </a:p>
@@ -1322,7 +972,7 @@
           <a:p>
             <a:fld id="{B606C5D1-9323-1B45-8355-7D55EA8EE66A}" type="datetime4">
               <a:rPr lang="en-US" smtClean="0"/>
-              <a:t>December 12, 2020</a:t>
+              <a:t>December 19, 2020</a:t>
             </a:fld>
             <a:endParaRPr lang="en-US" dirty="0"/>
           </a:p>
@@ -1570,7 +1220,7 @@
           <a:p>
             <a:fld id="{A4108F21-3CFE-3045-9ABB-E1E1413BA1A1}" type="datetime4">
               <a:rPr lang="en-US" smtClean="0"/>
-              <a:t>December 12, 2020</a:t>
+              <a:t>December 19, 2020</a:t>
             </a:fld>
             <a:endParaRPr lang="en-US" dirty="0"/>
           </a:p>
@@ -1802,1171 +1452,6 @@
   </p:cSld>
   <p:clrMapOvr>
     <a:overrideClrMapping bg1="dk1" tx1="lt1" bg2="dk2" tx2="lt2" accent1="accent1" accent2="accent2" accent3="accent3" accent4="accent4" accent5="accent5" accent6="accent6" hlink="hlink" folHlink="folHlink"/>
-  </p:clrMapOvr>
-</p:sldLayout>
-</file>
-
-<file path=ppt/slideLayouts/slideLayout5.xml><?xml version="1.0" encoding="utf-8"?>
-<p:sldLayout xmlns:a="http://schemas.openxmlformats.org/drawingml/2006/main" xmlns:r="http://schemas.openxmlformats.org/officeDocument/2006/relationships" xmlns:p="http://schemas.openxmlformats.org/presentationml/2006/main" type="twoTxTwoObj" preserve="1">
-  <p:cSld name="Comparison">
-    <p:spTree>
-      <p:nvGrpSpPr>
-        <p:cNvPr id="1" name=""/>
-        <p:cNvGrpSpPr/>
-        <p:nvPr/>
-      </p:nvGrpSpPr>
-      <p:grpSpPr>
-        <a:xfrm>
-          <a:off x="0" y="0"/>
-          <a:ext cx="0" cy="0"/>
-          <a:chOff x="0" y="0"/>
-          <a:chExt cx="0" cy="0"/>
-        </a:xfrm>
-      </p:grpSpPr>
-      <p:sp>
-        <p:nvSpPr>
-          <p:cNvPr id="2" name="Title 1"/>
-          <p:cNvSpPr>
-            <a:spLocks noGrp="1"/>
-          </p:cNvSpPr>
-          <p:nvPr>
-            <p:ph type="title"/>
-          </p:nvPr>
-        </p:nvSpPr>
-        <p:spPr/>
-        <p:txBody>
-          <a:bodyPr/>
-          <a:lstStyle>
-            <a:lvl1pPr>
-              <a:defRPr/>
-            </a:lvl1pPr>
-          </a:lstStyle>
-          <a:p>
-            <a:r>
-              <a:rPr lang="en-US" smtClean="0"/>
-              <a:t>Click to edit Master title style</a:t>
-            </a:r>
-            <a:endParaRPr lang="en-US"/>
-          </a:p>
-        </p:txBody>
-      </p:sp>
-      <p:sp>
-        <p:nvSpPr>
-          <p:cNvPr id="3" name="Text Placeholder 2"/>
-          <p:cNvSpPr>
-            <a:spLocks noGrp="1"/>
-          </p:cNvSpPr>
-          <p:nvPr>
-            <p:ph type="body" idx="1"/>
-          </p:nvPr>
-        </p:nvSpPr>
-        <p:spPr>
-          <a:xfrm>
-            <a:off x="457200" y="1535113"/>
-            <a:ext cx="4040188" cy="639762"/>
-          </a:xfrm>
-        </p:spPr>
-        <p:txBody>
-          <a:bodyPr anchor="b"/>
-          <a:lstStyle>
-            <a:lvl1pPr marL="0" indent="0">
-              <a:buNone/>
-              <a:defRPr sz="2400" b="1"/>
-            </a:lvl1pPr>
-            <a:lvl2pPr marL="457200" indent="0">
-              <a:buNone/>
-              <a:defRPr sz="2000" b="1"/>
-            </a:lvl2pPr>
-            <a:lvl3pPr marL="914400" indent="0">
-              <a:buNone/>
-              <a:defRPr sz="1800" b="1"/>
-            </a:lvl3pPr>
-            <a:lvl4pPr marL="1371600" indent="0">
-              <a:buNone/>
-              <a:defRPr sz="1600" b="1"/>
-            </a:lvl4pPr>
-            <a:lvl5pPr marL="1828800" indent="0">
-              <a:buNone/>
-              <a:defRPr sz="1600" b="1"/>
-            </a:lvl5pPr>
-            <a:lvl6pPr marL="2286000" indent="0">
-              <a:buNone/>
-              <a:defRPr sz="1600" b="1"/>
-            </a:lvl6pPr>
-            <a:lvl7pPr marL="2743200" indent="0">
-              <a:buNone/>
-              <a:defRPr sz="1600" b="1"/>
-            </a:lvl7pPr>
-            <a:lvl8pPr marL="3200400" indent="0">
-              <a:buNone/>
-              <a:defRPr sz="1600" b="1"/>
-            </a:lvl8pPr>
-            <a:lvl9pPr marL="3657600" indent="0">
-              <a:buNone/>
-              <a:defRPr sz="1600" b="1"/>
-            </a:lvl9pPr>
-          </a:lstStyle>
-          <a:p>
-            <a:pPr lvl="0"/>
-            <a:r>
-              <a:rPr lang="en-US" smtClean="0"/>
-              <a:t>Click to edit Master text styles</a:t>
-            </a:r>
-          </a:p>
-        </p:txBody>
-      </p:sp>
-      <p:sp>
-        <p:nvSpPr>
-          <p:cNvPr id="4" name="Content Placeholder 3"/>
-          <p:cNvSpPr>
-            <a:spLocks noGrp="1"/>
-          </p:cNvSpPr>
-          <p:nvPr>
-            <p:ph sz="half" idx="2"/>
-          </p:nvPr>
-        </p:nvSpPr>
-        <p:spPr>
-          <a:xfrm>
-            <a:off x="457200" y="2174875"/>
-            <a:ext cx="4040188" cy="3951288"/>
-          </a:xfrm>
-        </p:spPr>
-        <p:txBody>
-          <a:bodyPr/>
-          <a:lstStyle>
-            <a:lvl1pPr>
-              <a:defRPr sz="2400"/>
-            </a:lvl1pPr>
-            <a:lvl2pPr>
-              <a:defRPr sz="2000"/>
-            </a:lvl2pPr>
-            <a:lvl3pPr>
-              <a:defRPr sz="1800"/>
-            </a:lvl3pPr>
-            <a:lvl4pPr>
-              <a:defRPr sz="1600"/>
-            </a:lvl4pPr>
-            <a:lvl5pPr>
-              <a:defRPr sz="1600"/>
-            </a:lvl5pPr>
-            <a:lvl6pPr>
-              <a:defRPr sz="1600"/>
-            </a:lvl6pPr>
-            <a:lvl7pPr>
-              <a:defRPr sz="1600"/>
-            </a:lvl7pPr>
-            <a:lvl8pPr>
-              <a:defRPr sz="1600"/>
-            </a:lvl8pPr>
-            <a:lvl9pPr>
-              <a:defRPr sz="1600"/>
-            </a:lvl9pPr>
-          </a:lstStyle>
-          <a:p>
-            <a:pPr lvl="0"/>
-            <a:r>
-              <a:rPr lang="en-US" smtClean="0"/>
-              <a:t>Click to edit Master text styles</a:t>
-            </a:r>
-          </a:p>
-          <a:p>
-            <a:pPr lvl="1"/>
-            <a:r>
-              <a:rPr lang="en-US" smtClean="0"/>
-              <a:t>Second level</a:t>
-            </a:r>
-          </a:p>
-          <a:p>
-            <a:pPr lvl="2"/>
-            <a:r>
-              <a:rPr lang="en-US" smtClean="0"/>
-              <a:t>Third level</a:t>
-            </a:r>
-          </a:p>
-          <a:p>
-            <a:pPr lvl="3"/>
-            <a:r>
-              <a:rPr lang="en-US" smtClean="0"/>
-              <a:t>Fourth level</a:t>
-            </a:r>
-          </a:p>
-          <a:p>
-            <a:pPr lvl="4"/>
-            <a:r>
-              <a:rPr lang="en-US" smtClean="0"/>
-              <a:t>Fifth level</a:t>
-            </a:r>
-            <a:endParaRPr lang="en-US"/>
-          </a:p>
-        </p:txBody>
-      </p:sp>
-      <p:sp>
-        <p:nvSpPr>
-          <p:cNvPr id="5" name="Text Placeholder 4"/>
-          <p:cNvSpPr>
-            <a:spLocks noGrp="1"/>
-          </p:cNvSpPr>
-          <p:nvPr>
-            <p:ph type="body" sz="quarter" idx="3"/>
-          </p:nvPr>
-        </p:nvSpPr>
-        <p:spPr>
-          <a:xfrm>
-            <a:off x="4645025" y="1535113"/>
-            <a:ext cx="4041775" cy="639762"/>
-          </a:xfrm>
-        </p:spPr>
-        <p:txBody>
-          <a:bodyPr anchor="b"/>
-          <a:lstStyle>
-            <a:lvl1pPr marL="0" indent="0">
-              <a:buNone/>
-              <a:defRPr sz="2400" b="1"/>
-            </a:lvl1pPr>
-            <a:lvl2pPr marL="457200" indent="0">
-              <a:buNone/>
-              <a:defRPr sz="2000" b="1"/>
-            </a:lvl2pPr>
-            <a:lvl3pPr marL="914400" indent="0">
-              <a:buNone/>
-              <a:defRPr sz="1800" b="1"/>
-            </a:lvl3pPr>
-            <a:lvl4pPr marL="1371600" indent="0">
-              <a:buNone/>
-              <a:defRPr sz="1600" b="1"/>
-            </a:lvl4pPr>
-            <a:lvl5pPr marL="1828800" indent="0">
-              <a:buNone/>
-              <a:defRPr sz="1600" b="1"/>
-            </a:lvl5pPr>
-            <a:lvl6pPr marL="2286000" indent="0">
-              <a:buNone/>
-              <a:defRPr sz="1600" b="1"/>
-            </a:lvl6pPr>
-            <a:lvl7pPr marL="2743200" indent="0">
-              <a:buNone/>
-              <a:defRPr sz="1600" b="1"/>
-            </a:lvl7pPr>
-            <a:lvl8pPr marL="3200400" indent="0">
-              <a:buNone/>
-              <a:defRPr sz="1600" b="1"/>
-            </a:lvl8pPr>
-            <a:lvl9pPr marL="3657600" indent="0">
-              <a:buNone/>
-              <a:defRPr sz="1600" b="1"/>
-            </a:lvl9pPr>
-          </a:lstStyle>
-          <a:p>
-            <a:pPr lvl="0"/>
-            <a:r>
-              <a:rPr lang="en-US" smtClean="0"/>
-              <a:t>Click to edit Master text styles</a:t>
-            </a:r>
-          </a:p>
-        </p:txBody>
-      </p:sp>
-      <p:sp>
-        <p:nvSpPr>
-          <p:cNvPr id="6" name="Content Placeholder 5"/>
-          <p:cNvSpPr>
-            <a:spLocks noGrp="1"/>
-          </p:cNvSpPr>
-          <p:nvPr>
-            <p:ph sz="quarter" idx="4"/>
-          </p:nvPr>
-        </p:nvSpPr>
-        <p:spPr>
-          <a:xfrm>
-            <a:off x="4645025" y="2174875"/>
-            <a:ext cx="4041775" cy="3951288"/>
-          </a:xfrm>
-        </p:spPr>
-        <p:txBody>
-          <a:bodyPr/>
-          <a:lstStyle>
-            <a:lvl1pPr>
-              <a:defRPr sz="2400"/>
-            </a:lvl1pPr>
-            <a:lvl2pPr>
-              <a:defRPr sz="2000"/>
-            </a:lvl2pPr>
-            <a:lvl3pPr>
-              <a:defRPr sz="1800"/>
-            </a:lvl3pPr>
-            <a:lvl4pPr>
-              <a:defRPr sz="1600"/>
-            </a:lvl4pPr>
-            <a:lvl5pPr>
-              <a:defRPr sz="1600"/>
-            </a:lvl5pPr>
-            <a:lvl6pPr>
-              <a:defRPr sz="1600"/>
-            </a:lvl6pPr>
-            <a:lvl7pPr>
-              <a:defRPr sz="1600"/>
-            </a:lvl7pPr>
-            <a:lvl8pPr>
-              <a:defRPr sz="1600"/>
-            </a:lvl8pPr>
-            <a:lvl9pPr>
-              <a:defRPr sz="1600"/>
-            </a:lvl9pPr>
-          </a:lstStyle>
-          <a:p>
-            <a:pPr lvl="0"/>
-            <a:r>
-              <a:rPr lang="en-US" smtClean="0"/>
-              <a:t>Click to edit Master text styles</a:t>
-            </a:r>
-          </a:p>
-          <a:p>
-            <a:pPr lvl="1"/>
-            <a:r>
-              <a:rPr lang="en-US" smtClean="0"/>
-              <a:t>Second level</a:t>
-            </a:r>
-          </a:p>
-          <a:p>
-            <a:pPr lvl="2"/>
-            <a:r>
-              <a:rPr lang="en-US" smtClean="0"/>
-              <a:t>Third level</a:t>
-            </a:r>
-          </a:p>
-          <a:p>
-            <a:pPr lvl="3"/>
-            <a:r>
-              <a:rPr lang="en-US" smtClean="0"/>
-              <a:t>Fourth level</a:t>
-            </a:r>
-          </a:p>
-          <a:p>
-            <a:pPr lvl="4"/>
-            <a:r>
-              <a:rPr lang="en-US" smtClean="0"/>
-              <a:t>Fifth level</a:t>
-            </a:r>
-            <a:endParaRPr lang="en-US"/>
-          </a:p>
-        </p:txBody>
-      </p:sp>
-      <p:sp>
-        <p:nvSpPr>
-          <p:cNvPr id="7" name="Date Placeholder 6"/>
-          <p:cNvSpPr>
-            <a:spLocks noGrp="1"/>
-          </p:cNvSpPr>
-          <p:nvPr>
-            <p:ph type="dt" sz="half" idx="10"/>
-          </p:nvPr>
-        </p:nvSpPr>
-        <p:spPr/>
-        <p:txBody>
-          <a:bodyPr/>
-          <a:lstStyle/>
-          <a:p>
-            <a:fld id="{241EB5C9-1307-BA42-ABA2-0BC069CD8E7F}" type="datetimeFigureOut">
-              <a:rPr lang="en-US" smtClean="0"/>
-              <a:t>4/5/2019</a:t>
-            </a:fld>
-            <a:endParaRPr lang="en-US"/>
-          </a:p>
-        </p:txBody>
-      </p:sp>
-      <p:sp>
-        <p:nvSpPr>
-          <p:cNvPr id="8" name="Footer Placeholder 7"/>
-          <p:cNvSpPr>
-            <a:spLocks noGrp="1"/>
-          </p:cNvSpPr>
-          <p:nvPr>
-            <p:ph type="ftr" sz="quarter" idx="11"/>
-          </p:nvPr>
-        </p:nvSpPr>
-        <p:spPr/>
-        <p:txBody>
-          <a:bodyPr/>
-          <a:lstStyle/>
-          <a:p>
-            <a:endParaRPr lang="en-US"/>
-          </a:p>
-        </p:txBody>
-      </p:sp>
-      <p:sp>
-        <p:nvSpPr>
-          <p:cNvPr id="9" name="Slide Number Placeholder 8"/>
-          <p:cNvSpPr>
-            <a:spLocks noGrp="1"/>
-          </p:cNvSpPr>
-          <p:nvPr>
-            <p:ph type="sldNum" sz="quarter" idx="12"/>
-          </p:nvPr>
-        </p:nvSpPr>
-        <p:spPr/>
-        <p:txBody>
-          <a:bodyPr/>
-          <a:lstStyle/>
-          <a:p>
-            <a:fld id="{C5EF2332-01BF-834F-8236-50238282D533}" type="slidenum">
-              <a:rPr lang="en-US" smtClean="0"/>
-              <a:t>‹#›</a:t>
-            </a:fld>
-            <a:endParaRPr lang="en-US"/>
-          </a:p>
-        </p:txBody>
-      </p:sp>
-    </p:spTree>
-    <p:extLst>
-      <p:ext uri="{BB962C8B-B14F-4D97-AF65-F5344CB8AC3E}">
-        <p14:creationId xmlns:p14="http://schemas.microsoft.com/office/powerpoint/2010/main" val="2535793967"/>
-      </p:ext>
-    </p:extLst>
-  </p:cSld>
-  <p:clrMapOvr>
-    <a:masterClrMapping/>
-  </p:clrMapOvr>
-</p:sldLayout>
-</file>
-
-<file path=ppt/slideLayouts/slideLayout6.xml><?xml version="1.0" encoding="utf-8"?>
-<p:sldLayout xmlns:a="http://schemas.openxmlformats.org/drawingml/2006/main" xmlns:r="http://schemas.openxmlformats.org/officeDocument/2006/relationships" xmlns:p="http://schemas.openxmlformats.org/presentationml/2006/main" type="titleOnly" preserve="1">
-  <p:cSld name="Title Only">
-    <p:spTree>
-      <p:nvGrpSpPr>
-        <p:cNvPr id="1" name=""/>
-        <p:cNvGrpSpPr/>
-        <p:nvPr/>
-      </p:nvGrpSpPr>
-      <p:grpSpPr>
-        <a:xfrm>
-          <a:off x="0" y="0"/>
-          <a:ext cx="0" cy="0"/>
-          <a:chOff x="0" y="0"/>
-          <a:chExt cx="0" cy="0"/>
-        </a:xfrm>
-      </p:grpSpPr>
-      <p:sp>
-        <p:nvSpPr>
-          <p:cNvPr id="2" name="Title 1"/>
-          <p:cNvSpPr>
-            <a:spLocks noGrp="1"/>
-          </p:cNvSpPr>
-          <p:nvPr>
-            <p:ph type="title"/>
-          </p:nvPr>
-        </p:nvSpPr>
-        <p:spPr/>
-        <p:txBody>
-          <a:bodyPr/>
-          <a:lstStyle/>
-          <a:p>
-            <a:r>
-              <a:rPr lang="en-US" smtClean="0"/>
-              <a:t>Click to edit Master title style</a:t>
-            </a:r>
-            <a:endParaRPr lang="en-US"/>
-          </a:p>
-        </p:txBody>
-      </p:sp>
-      <p:sp>
-        <p:nvSpPr>
-          <p:cNvPr id="3" name="Date Placeholder 2"/>
-          <p:cNvSpPr>
-            <a:spLocks noGrp="1"/>
-          </p:cNvSpPr>
-          <p:nvPr>
-            <p:ph type="dt" sz="half" idx="10"/>
-          </p:nvPr>
-        </p:nvSpPr>
-        <p:spPr/>
-        <p:txBody>
-          <a:bodyPr/>
-          <a:lstStyle/>
-          <a:p>
-            <a:fld id="{241EB5C9-1307-BA42-ABA2-0BC069CD8E7F}" type="datetimeFigureOut">
-              <a:rPr lang="en-US" smtClean="0"/>
-              <a:t>4/5/2019</a:t>
-            </a:fld>
-            <a:endParaRPr lang="en-US"/>
-          </a:p>
-        </p:txBody>
-      </p:sp>
-      <p:sp>
-        <p:nvSpPr>
-          <p:cNvPr id="4" name="Footer Placeholder 3"/>
-          <p:cNvSpPr>
-            <a:spLocks noGrp="1"/>
-          </p:cNvSpPr>
-          <p:nvPr>
-            <p:ph type="ftr" sz="quarter" idx="11"/>
-          </p:nvPr>
-        </p:nvSpPr>
-        <p:spPr/>
-        <p:txBody>
-          <a:bodyPr/>
-          <a:lstStyle/>
-          <a:p>
-            <a:endParaRPr lang="en-US"/>
-          </a:p>
-        </p:txBody>
-      </p:sp>
-      <p:sp>
-        <p:nvSpPr>
-          <p:cNvPr id="5" name="Slide Number Placeholder 4"/>
-          <p:cNvSpPr>
-            <a:spLocks noGrp="1"/>
-          </p:cNvSpPr>
-          <p:nvPr>
-            <p:ph type="sldNum" sz="quarter" idx="12"/>
-          </p:nvPr>
-        </p:nvSpPr>
-        <p:spPr/>
-        <p:txBody>
-          <a:bodyPr/>
-          <a:lstStyle/>
-          <a:p>
-            <a:fld id="{C5EF2332-01BF-834F-8236-50238282D533}" type="slidenum">
-              <a:rPr lang="en-US" smtClean="0"/>
-              <a:t>‹#›</a:t>
-            </a:fld>
-            <a:endParaRPr lang="en-US"/>
-          </a:p>
-        </p:txBody>
-      </p:sp>
-    </p:spTree>
-    <p:extLst>
-      <p:ext uri="{BB962C8B-B14F-4D97-AF65-F5344CB8AC3E}">
-        <p14:creationId xmlns:p14="http://schemas.microsoft.com/office/powerpoint/2010/main" val="3472721253"/>
-      </p:ext>
-    </p:extLst>
-  </p:cSld>
-  <p:clrMapOvr>
-    <a:masterClrMapping/>
-  </p:clrMapOvr>
-</p:sldLayout>
-</file>
-
-<file path=ppt/slideLayouts/slideLayout7.xml><?xml version="1.0" encoding="utf-8"?>
-<p:sldLayout xmlns:a="http://schemas.openxmlformats.org/drawingml/2006/main" xmlns:r="http://schemas.openxmlformats.org/officeDocument/2006/relationships" xmlns:p="http://schemas.openxmlformats.org/presentationml/2006/main" type="blank" preserve="1">
-  <p:cSld name="Blank">
-    <p:spTree>
-      <p:nvGrpSpPr>
-        <p:cNvPr id="1" name=""/>
-        <p:cNvGrpSpPr/>
-        <p:nvPr/>
-      </p:nvGrpSpPr>
-      <p:grpSpPr>
-        <a:xfrm>
-          <a:off x="0" y="0"/>
-          <a:ext cx="0" cy="0"/>
-          <a:chOff x="0" y="0"/>
-          <a:chExt cx="0" cy="0"/>
-        </a:xfrm>
-      </p:grpSpPr>
-      <p:sp>
-        <p:nvSpPr>
-          <p:cNvPr id="2" name="Date Placeholder 1"/>
-          <p:cNvSpPr>
-            <a:spLocks noGrp="1"/>
-          </p:cNvSpPr>
-          <p:nvPr>
-            <p:ph type="dt" sz="half" idx="10"/>
-          </p:nvPr>
-        </p:nvSpPr>
-        <p:spPr/>
-        <p:txBody>
-          <a:bodyPr/>
-          <a:lstStyle/>
-          <a:p>
-            <a:fld id="{241EB5C9-1307-BA42-ABA2-0BC069CD8E7F}" type="datetimeFigureOut">
-              <a:rPr lang="en-US" smtClean="0"/>
-              <a:t>4/5/2019</a:t>
-            </a:fld>
-            <a:endParaRPr lang="en-US"/>
-          </a:p>
-        </p:txBody>
-      </p:sp>
-      <p:sp>
-        <p:nvSpPr>
-          <p:cNvPr id="3" name="Footer Placeholder 2"/>
-          <p:cNvSpPr>
-            <a:spLocks noGrp="1"/>
-          </p:cNvSpPr>
-          <p:nvPr>
-            <p:ph type="ftr" sz="quarter" idx="11"/>
-          </p:nvPr>
-        </p:nvSpPr>
-        <p:spPr/>
-        <p:txBody>
-          <a:bodyPr/>
-          <a:lstStyle/>
-          <a:p>
-            <a:endParaRPr lang="en-US"/>
-          </a:p>
-        </p:txBody>
-      </p:sp>
-      <p:sp>
-        <p:nvSpPr>
-          <p:cNvPr id="4" name="Slide Number Placeholder 3"/>
-          <p:cNvSpPr>
-            <a:spLocks noGrp="1"/>
-          </p:cNvSpPr>
-          <p:nvPr>
-            <p:ph type="sldNum" sz="quarter" idx="12"/>
-          </p:nvPr>
-        </p:nvSpPr>
-        <p:spPr/>
-        <p:txBody>
-          <a:bodyPr/>
-          <a:lstStyle/>
-          <a:p>
-            <a:fld id="{C5EF2332-01BF-834F-8236-50238282D533}" type="slidenum">
-              <a:rPr lang="en-US" smtClean="0"/>
-              <a:t>‹#›</a:t>
-            </a:fld>
-            <a:endParaRPr lang="en-US"/>
-          </a:p>
-        </p:txBody>
-      </p:sp>
-    </p:spTree>
-    <p:extLst>
-      <p:ext uri="{BB962C8B-B14F-4D97-AF65-F5344CB8AC3E}">
-        <p14:creationId xmlns:p14="http://schemas.microsoft.com/office/powerpoint/2010/main" val="2130901097"/>
-      </p:ext>
-    </p:extLst>
-  </p:cSld>
-  <p:clrMapOvr>
-    <a:masterClrMapping/>
-  </p:clrMapOvr>
-</p:sldLayout>
-</file>
-
-<file path=ppt/slideLayouts/slideLayout8.xml><?xml version="1.0" encoding="utf-8"?>
-<p:sldLayout xmlns:a="http://schemas.openxmlformats.org/drawingml/2006/main" xmlns:r="http://schemas.openxmlformats.org/officeDocument/2006/relationships" xmlns:p="http://schemas.openxmlformats.org/presentationml/2006/main" type="objTx" preserve="1">
-  <p:cSld name="Content with Caption">
-    <p:spTree>
-      <p:nvGrpSpPr>
-        <p:cNvPr id="1" name=""/>
-        <p:cNvGrpSpPr/>
-        <p:nvPr/>
-      </p:nvGrpSpPr>
-      <p:grpSpPr>
-        <a:xfrm>
-          <a:off x="0" y="0"/>
-          <a:ext cx="0" cy="0"/>
-          <a:chOff x="0" y="0"/>
-          <a:chExt cx="0" cy="0"/>
-        </a:xfrm>
-      </p:grpSpPr>
-      <p:sp>
-        <p:nvSpPr>
-          <p:cNvPr id="2" name="Title 1"/>
-          <p:cNvSpPr>
-            <a:spLocks noGrp="1"/>
-          </p:cNvSpPr>
-          <p:nvPr>
-            <p:ph type="title"/>
-          </p:nvPr>
-        </p:nvSpPr>
-        <p:spPr>
-          <a:xfrm>
-            <a:off x="457200" y="273050"/>
-            <a:ext cx="3008313" cy="1162050"/>
-          </a:xfrm>
-        </p:spPr>
-        <p:txBody>
-          <a:bodyPr anchor="b"/>
-          <a:lstStyle>
-            <a:lvl1pPr algn="l">
-              <a:defRPr sz="2000" b="1"/>
-            </a:lvl1pPr>
-          </a:lstStyle>
-          <a:p>
-            <a:r>
-              <a:rPr lang="en-US" smtClean="0"/>
-              <a:t>Click to edit Master title style</a:t>
-            </a:r>
-            <a:endParaRPr lang="en-US"/>
-          </a:p>
-        </p:txBody>
-      </p:sp>
-      <p:sp>
-        <p:nvSpPr>
-          <p:cNvPr id="3" name="Content Placeholder 2"/>
-          <p:cNvSpPr>
-            <a:spLocks noGrp="1"/>
-          </p:cNvSpPr>
-          <p:nvPr>
-            <p:ph idx="1"/>
-          </p:nvPr>
-        </p:nvSpPr>
-        <p:spPr>
-          <a:xfrm>
-            <a:off x="3575050" y="273050"/>
-            <a:ext cx="5111750" cy="5853113"/>
-          </a:xfrm>
-        </p:spPr>
-        <p:txBody>
-          <a:bodyPr/>
-          <a:lstStyle>
-            <a:lvl1pPr>
-              <a:defRPr sz="3200"/>
-            </a:lvl1pPr>
-            <a:lvl2pPr>
-              <a:defRPr sz="2800"/>
-            </a:lvl2pPr>
-            <a:lvl3pPr>
-              <a:defRPr sz="2400"/>
-            </a:lvl3pPr>
-            <a:lvl4pPr>
-              <a:defRPr sz="2000"/>
-            </a:lvl4pPr>
-            <a:lvl5pPr>
-              <a:defRPr sz="2000"/>
-            </a:lvl5pPr>
-            <a:lvl6pPr>
-              <a:defRPr sz="2000"/>
-            </a:lvl6pPr>
-            <a:lvl7pPr>
-              <a:defRPr sz="2000"/>
-            </a:lvl7pPr>
-            <a:lvl8pPr>
-              <a:defRPr sz="2000"/>
-            </a:lvl8pPr>
-            <a:lvl9pPr>
-              <a:defRPr sz="2000"/>
-            </a:lvl9pPr>
-          </a:lstStyle>
-          <a:p>
-            <a:pPr lvl="0"/>
-            <a:r>
-              <a:rPr lang="en-US" smtClean="0"/>
-              <a:t>Click to edit Master text styles</a:t>
-            </a:r>
-          </a:p>
-          <a:p>
-            <a:pPr lvl="1"/>
-            <a:r>
-              <a:rPr lang="en-US" smtClean="0"/>
-              <a:t>Second level</a:t>
-            </a:r>
-          </a:p>
-          <a:p>
-            <a:pPr lvl="2"/>
-            <a:r>
-              <a:rPr lang="en-US" smtClean="0"/>
-              <a:t>Third level</a:t>
-            </a:r>
-          </a:p>
-          <a:p>
-            <a:pPr lvl="3"/>
-            <a:r>
-              <a:rPr lang="en-US" smtClean="0"/>
-              <a:t>Fourth level</a:t>
-            </a:r>
-          </a:p>
-          <a:p>
-            <a:pPr lvl="4"/>
-            <a:r>
-              <a:rPr lang="en-US" smtClean="0"/>
-              <a:t>Fifth level</a:t>
-            </a:r>
-            <a:endParaRPr lang="en-US"/>
-          </a:p>
-        </p:txBody>
-      </p:sp>
-      <p:sp>
-        <p:nvSpPr>
-          <p:cNvPr id="4" name="Text Placeholder 3"/>
-          <p:cNvSpPr>
-            <a:spLocks noGrp="1"/>
-          </p:cNvSpPr>
-          <p:nvPr>
-            <p:ph type="body" sz="half" idx="2"/>
-          </p:nvPr>
-        </p:nvSpPr>
-        <p:spPr>
-          <a:xfrm>
-            <a:off x="457200" y="1435100"/>
-            <a:ext cx="3008313" cy="4691063"/>
-          </a:xfrm>
-        </p:spPr>
-        <p:txBody>
-          <a:bodyPr/>
-          <a:lstStyle>
-            <a:lvl1pPr marL="0" indent="0">
-              <a:buNone/>
-              <a:defRPr sz="1400"/>
-            </a:lvl1pPr>
-            <a:lvl2pPr marL="457200" indent="0">
-              <a:buNone/>
-              <a:defRPr sz="1200"/>
-            </a:lvl2pPr>
-            <a:lvl3pPr marL="914400" indent="0">
-              <a:buNone/>
-              <a:defRPr sz="1000"/>
-            </a:lvl3pPr>
-            <a:lvl4pPr marL="1371600" indent="0">
-              <a:buNone/>
-              <a:defRPr sz="900"/>
-            </a:lvl4pPr>
-            <a:lvl5pPr marL="1828800" indent="0">
-              <a:buNone/>
-              <a:defRPr sz="900"/>
-            </a:lvl5pPr>
-            <a:lvl6pPr marL="2286000" indent="0">
-              <a:buNone/>
-              <a:defRPr sz="900"/>
-            </a:lvl6pPr>
-            <a:lvl7pPr marL="2743200" indent="0">
-              <a:buNone/>
-              <a:defRPr sz="900"/>
-            </a:lvl7pPr>
-            <a:lvl8pPr marL="3200400" indent="0">
-              <a:buNone/>
-              <a:defRPr sz="900"/>
-            </a:lvl8pPr>
-            <a:lvl9pPr marL="3657600" indent="0">
-              <a:buNone/>
-              <a:defRPr sz="900"/>
-            </a:lvl9pPr>
-          </a:lstStyle>
-          <a:p>
-            <a:pPr lvl="0"/>
-            <a:r>
-              <a:rPr lang="en-US" smtClean="0"/>
-              <a:t>Click to edit Master text styles</a:t>
-            </a:r>
-          </a:p>
-        </p:txBody>
-      </p:sp>
-      <p:sp>
-        <p:nvSpPr>
-          <p:cNvPr id="5" name="Date Placeholder 4"/>
-          <p:cNvSpPr>
-            <a:spLocks noGrp="1"/>
-          </p:cNvSpPr>
-          <p:nvPr>
-            <p:ph type="dt" sz="half" idx="10"/>
-          </p:nvPr>
-        </p:nvSpPr>
-        <p:spPr/>
-        <p:txBody>
-          <a:bodyPr/>
-          <a:lstStyle/>
-          <a:p>
-            <a:fld id="{241EB5C9-1307-BA42-ABA2-0BC069CD8E7F}" type="datetimeFigureOut">
-              <a:rPr lang="en-US" smtClean="0"/>
-              <a:t>4/5/2019</a:t>
-            </a:fld>
-            <a:endParaRPr lang="en-US"/>
-          </a:p>
-        </p:txBody>
-      </p:sp>
-      <p:sp>
-        <p:nvSpPr>
-          <p:cNvPr id="6" name="Footer Placeholder 5"/>
-          <p:cNvSpPr>
-            <a:spLocks noGrp="1"/>
-          </p:cNvSpPr>
-          <p:nvPr>
-            <p:ph type="ftr" sz="quarter" idx="11"/>
-          </p:nvPr>
-        </p:nvSpPr>
-        <p:spPr/>
-        <p:txBody>
-          <a:bodyPr/>
-          <a:lstStyle/>
-          <a:p>
-            <a:endParaRPr lang="en-US"/>
-          </a:p>
-        </p:txBody>
-      </p:sp>
-      <p:sp>
-        <p:nvSpPr>
-          <p:cNvPr id="7" name="Slide Number Placeholder 6"/>
-          <p:cNvSpPr>
-            <a:spLocks noGrp="1"/>
-          </p:cNvSpPr>
-          <p:nvPr>
-            <p:ph type="sldNum" sz="quarter" idx="12"/>
-          </p:nvPr>
-        </p:nvSpPr>
-        <p:spPr/>
-        <p:txBody>
-          <a:bodyPr/>
-          <a:lstStyle/>
-          <a:p>
-            <a:fld id="{C5EF2332-01BF-834F-8236-50238282D533}" type="slidenum">
-              <a:rPr lang="en-US" smtClean="0"/>
-              <a:t>‹#›</a:t>
-            </a:fld>
-            <a:endParaRPr lang="en-US"/>
-          </a:p>
-        </p:txBody>
-      </p:sp>
-    </p:spTree>
-    <p:extLst>
-      <p:ext uri="{BB962C8B-B14F-4D97-AF65-F5344CB8AC3E}">
-        <p14:creationId xmlns:p14="http://schemas.microsoft.com/office/powerpoint/2010/main" val="3540895647"/>
-      </p:ext>
-    </p:extLst>
-  </p:cSld>
-  <p:clrMapOvr>
-    <a:masterClrMapping/>
-  </p:clrMapOvr>
-</p:sldLayout>
-</file>
-
-<file path=ppt/slideLayouts/slideLayout9.xml><?xml version="1.0" encoding="utf-8"?>
-<p:sldLayout xmlns:a="http://schemas.openxmlformats.org/drawingml/2006/main" xmlns:r="http://schemas.openxmlformats.org/officeDocument/2006/relationships" xmlns:p="http://schemas.openxmlformats.org/presentationml/2006/main" type="picTx" preserve="1">
-  <p:cSld name="Picture with Caption">
-    <p:spTree>
-      <p:nvGrpSpPr>
-        <p:cNvPr id="1" name=""/>
-        <p:cNvGrpSpPr/>
-        <p:nvPr/>
-      </p:nvGrpSpPr>
-      <p:grpSpPr>
-        <a:xfrm>
-          <a:off x="0" y="0"/>
-          <a:ext cx="0" cy="0"/>
-          <a:chOff x="0" y="0"/>
-          <a:chExt cx="0" cy="0"/>
-        </a:xfrm>
-      </p:grpSpPr>
-      <p:sp>
-        <p:nvSpPr>
-          <p:cNvPr id="2" name="Title 1"/>
-          <p:cNvSpPr>
-            <a:spLocks noGrp="1"/>
-          </p:cNvSpPr>
-          <p:nvPr>
-            <p:ph type="title"/>
-          </p:nvPr>
-        </p:nvSpPr>
-        <p:spPr>
-          <a:xfrm>
-            <a:off x="1792288" y="4800600"/>
-            <a:ext cx="5486400" cy="566738"/>
-          </a:xfrm>
-        </p:spPr>
-        <p:txBody>
-          <a:bodyPr anchor="b"/>
-          <a:lstStyle>
-            <a:lvl1pPr algn="l">
-              <a:defRPr sz="2000" b="1"/>
-            </a:lvl1pPr>
-          </a:lstStyle>
-          <a:p>
-            <a:r>
-              <a:rPr lang="en-US" smtClean="0"/>
-              <a:t>Click to edit Master title style</a:t>
-            </a:r>
-            <a:endParaRPr lang="en-US"/>
-          </a:p>
-        </p:txBody>
-      </p:sp>
-      <p:sp>
-        <p:nvSpPr>
-          <p:cNvPr id="3" name="Picture Placeholder 2"/>
-          <p:cNvSpPr>
-            <a:spLocks noGrp="1"/>
-          </p:cNvSpPr>
-          <p:nvPr>
-            <p:ph type="pic" idx="1"/>
-          </p:nvPr>
-        </p:nvSpPr>
-        <p:spPr>
-          <a:xfrm>
-            <a:off x="1792288" y="612775"/>
-            <a:ext cx="5486400" cy="4114800"/>
-          </a:xfrm>
-        </p:spPr>
-        <p:txBody>
-          <a:bodyPr/>
-          <a:lstStyle>
-            <a:lvl1pPr marL="0" indent="0">
-              <a:buNone/>
-              <a:defRPr sz="3200"/>
-            </a:lvl1pPr>
-            <a:lvl2pPr marL="457200" indent="0">
-              <a:buNone/>
-              <a:defRPr sz="2800"/>
-            </a:lvl2pPr>
-            <a:lvl3pPr marL="914400" indent="0">
-              <a:buNone/>
-              <a:defRPr sz="2400"/>
-            </a:lvl3pPr>
-            <a:lvl4pPr marL="1371600" indent="0">
-              <a:buNone/>
-              <a:defRPr sz="2000"/>
-            </a:lvl4pPr>
-            <a:lvl5pPr marL="1828800" indent="0">
-              <a:buNone/>
-              <a:defRPr sz="2000"/>
-            </a:lvl5pPr>
-            <a:lvl6pPr marL="2286000" indent="0">
-              <a:buNone/>
-              <a:defRPr sz="2000"/>
-            </a:lvl6pPr>
-            <a:lvl7pPr marL="2743200" indent="0">
-              <a:buNone/>
-              <a:defRPr sz="2000"/>
-            </a:lvl7pPr>
-            <a:lvl8pPr marL="3200400" indent="0">
-              <a:buNone/>
-              <a:defRPr sz="2000"/>
-            </a:lvl8pPr>
-            <a:lvl9pPr marL="3657600" indent="0">
-              <a:buNone/>
-              <a:defRPr sz="2000"/>
-            </a:lvl9pPr>
-          </a:lstStyle>
-          <a:p>
-            <a:endParaRPr lang="en-US"/>
-          </a:p>
-        </p:txBody>
-      </p:sp>
-      <p:sp>
-        <p:nvSpPr>
-          <p:cNvPr id="4" name="Text Placeholder 3"/>
-          <p:cNvSpPr>
-            <a:spLocks noGrp="1"/>
-          </p:cNvSpPr>
-          <p:nvPr>
-            <p:ph type="body" sz="half" idx="2"/>
-          </p:nvPr>
-        </p:nvSpPr>
-        <p:spPr>
-          <a:xfrm>
-            <a:off x="1792288" y="5367338"/>
-            <a:ext cx="5486400" cy="804862"/>
-          </a:xfrm>
-        </p:spPr>
-        <p:txBody>
-          <a:bodyPr/>
-          <a:lstStyle>
-            <a:lvl1pPr marL="0" indent="0">
-              <a:buNone/>
-              <a:defRPr sz="1400"/>
-            </a:lvl1pPr>
-            <a:lvl2pPr marL="457200" indent="0">
-              <a:buNone/>
-              <a:defRPr sz="1200"/>
-            </a:lvl2pPr>
-            <a:lvl3pPr marL="914400" indent="0">
-              <a:buNone/>
-              <a:defRPr sz="1000"/>
-            </a:lvl3pPr>
-            <a:lvl4pPr marL="1371600" indent="0">
-              <a:buNone/>
-              <a:defRPr sz="900"/>
-            </a:lvl4pPr>
-            <a:lvl5pPr marL="1828800" indent="0">
-              <a:buNone/>
-              <a:defRPr sz="900"/>
-            </a:lvl5pPr>
-            <a:lvl6pPr marL="2286000" indent="0">
-              <a:buNone/>
-              <a:defRPr sz="900"/>
-            </a:lvl6pPr>
-            <a:lvl7pPr marL="2743200" indent="0">
-              <a:buNone/>
-              <a:defRPr sz="900"/>
-            </a:lvl7pPr>
-            <a:lvl8pPr marL="3200400" indent="0">
-              <a:buNone/>
-              <a:defRPr sz="900"/>
-            </a:lvl8pPr>
-            <a:lvl9pPr marL="3657600" indent="0">
-              <a:buNone/>
-              <a:defRPr sz="900"/>
-            </a:lvl9pPr>
-          </a:lstStyle>
-          <a:p>
-            <a:pPr lvl="0"/>
-            <a:r>
-              <a:rPr lang="en-US" smtClean="0"/>
-              <a:t>Click to edit Master text styles</a:t>
-            </a:r>
-          </a:p>
-        </p:txBody>
-      </p:sp>
-      <p:sp>
-        <p:nvSpPr>
-          <p:cNvPr id="5" name="Date Placeholder 4"/>
-          <p:cNvSpPr>
-            <a:spLocks noGrp="1"/>
-          </p:cNvSpPr>
-          <p:nvPr>
-            <p:ph type="dt" sz="half" idx="10"/>
-          </p:nvPr>
-        </p:nvSpPr>
-        <p:spPr/>
-        <p:txBody>
-          <a:bodyPr/>
-          <a:lstStyle/>
-          <a:p>
-            <a:fld id="{241EB5C9-1307-BA42-ABA2-0BC069CD8E7F}" type="datetimeFigureOut">
-              <a:rPr lang="en-US" smtClean="0"/>
-              <a:t>4/5/2019</a:t>
-            </a:fld>
-            <a:endParaRPr lang="en-US"/>
-          </a:p>
-        </p:txBody>
-      </p:sp>
-      <p:sp>
-        <p:nvSpPr>
-          <p:cNvPr id="6" name="Footer Placeholder 5"/>
-          <p:cNvSpPr>
-            <a:spLocks noGrp="1"/>
-          </p:cNvSpPr>
-          <p:nvPr>
-            <p:ph type="ftr" sz="quarter" idx="11"/>
-          </p:nvPr>
-        </p:nvSpPr>
-        <p:spPr/>
-        <p:txBody>
-          <a:bodyPr/>
-          <a:lstStyle/>
-          <a:p>
-            <a:endParaRPr lang="en-US"/>
-          </a:p>
-        </p:txBody>
-      </p:sp>
-      <p:sp>
-        <p:nvSpPr>
-          <p:cNvPr id="7" name="Slide Number Placeholder 6"/>
-          <p:cNvSpPr>
-            <a:spLocks noGrp="1"/>
-          </p:cNvSpPr>
-          <p:nvPr>
-            <p:ph type="sldNum" sz="quarter" idx="12"/>
-          </p:nvPr>
-        </p:nvSpPr>
-        <p:spPr/>
-        <p:txBody>
-          <a:bodyPr/>
-          <a:lstStyle/>
-          <a:p>
-            <a:fld id="{C5EF2332-01BF-834F-8236-50238282D533}" type="slidenum">
-              <a:rPr lang="en-US" smtClean="0"/>
-              <a:t>‹#›</a:t>
-            </a:fld>
-            <a:endParaRPr lang="en-US"/>
-          </a:p>
-        </p:txBody>
-      </p:sp>
-    </p:spTree>
-    <p:extLst>
-      <p:ext uri="{BB962C8B-B14F-4D97-AF65-F5344CB8AC3E}">
-        <p14:creationId xmlns:p14="http://schemas.microsoft.com/office/powerpoint/2010/main" val="3566899855"/>
-      </p:ext>
-    </p:extLst>
-  </p:cSld>
-  <p:clrMapOvr>
-    <a:masterClrMapping/>
   </p:clrMapOvr>
 </p:sldLayout>
 </file>
@@ -3183,7 +1668,7 @@
           <a:p>
             <a:fld id="{5EF76A7A-0506-6C4D-8382-BFC753915B9A}" type="datetime4">
               <a:rPr lang="en-US" smtClean="0"/>
-              <a:t>December 12, 2020</a:t>
+              <a:t>December 19, 2020</a:t>
             </a:fld>
             <a:endParaRPr lang="en-US" dirty="0"/>
           </a:p>
@@ -3637,28 +2122,11 @@
           <a:bodyPr/>
           <a:lstStyle/>
           <a:p>
-            <a:pPr lvl="0" marL="0" indent="0">
+            <a:pPr marL="0" lvl="0" indent="0">
               <a:buNone/>
             </a:pPr>
             <a:r>
-              <a:rPr/>
-              <a:t>SamplePPT</a:t>
-            </a:r>
-            <a:r>
-              <a:rPr/>
-              <a:t> </a:t>
-            </a:r>
-            <a:r>
-              <a:rPr/>
-              <a:t>(PERSI</a:t>
-            </a:r>
-            <a:r>
-              <a:rPr/>
-              <a:t> </a:t>
-            </a:r>
-            <a:r>
-              <a:rPr/>
-              <a:t>graphs)</a:t>
+              <a:t>SamplePPT (PERSI graphs)</a:t>
             </a:r>
           </a:p>
         </p:txBody>
@@ -3683,46 +2151,13 @@
           <a:bodyPr/>
           <a:lstStyle/>
           <a:p>
-            <a:pPr lvl="0" marL="0" indent="0">
+            <a:pPr marL="0" lvl="0" indent="0">
               <a:buNone/>
             </a:pPr>
             <a:br/>
             <a:br/>
             <a:r>
-              <a:rPr/>
-              <a:t>Anil,</a:t>
-            </a:r>
-            <a:r>
-              <a:rPr/>
-              <a:t> </a:t>
-            </a:r>
-            <a:r>
-              <a:rPr/>
-              <a:t>Swaroop,</a:t>
-            </a:r>
-            <a:r>
-              <a:rPr/>
-              <a:t> </a:t>
-            </a:r>
-            <a:r>
-              <a:rPr/>
-              <a:t>Jen</a:t>
-            </a:r>
-            <a:r>
-              <a:rPr/>
-              <a:t> </a:t>
-            </a:r>
-            <a:r>
-              <a:rPr/>
-              <a:t>&amp;</a:t>
-            </a:r>
-            <a:r>
-              <a:rPr/>
-              <a:t> </a:t>
-            </a:r>
-            <a:r>
-              <a:rPr/>
-              <a:t>Jordan</a:t>
+              <a:t>Anil, Swaroop, Jen &amp; Jordan</a:t>
             </a:r>
           </a:p>
         </p:txBody>
@@ -3742,11 +2177,10 @@
           <a:bodyPr/>
           <a:lstStyle/>
           <a:p>
-            <a:pPr lvl="0" marL="0" indent="0">
+            <a:pPr marL="0" lvl="0" indent="0">
               <a:buNone/>
             </a:pPr>
             <a:r>
-              <a:rPr/>
               <a:t>12/12/2020</a:t>
             </a:r>
           </a:p>
@@ -3754,6 +2188,9 @@
       </p:sp>
     </p:spTree>
   </p:cSld>
+  <p:clrMapOvr>
+    <a:masterClrMapping/>
+  </p:clrMapOvr>
 </p:sld>
 </file>
 
@@ -3797,83 +2234,18 @@
           <a:bodyPr/>
           <a:lstStyle/>
           <a:p>
-            <a:pPr lvl="0" marL="0" indent="0">
+            <a:pPr marL="0" lvl="0" indent="0">
               <a:buNone/>
             </a:pPr>
             <a:r>
-              <a:rPr/>
-              <a:t>A</a:t>
-            </a:r>
-            <a:r>
-              <a:rPr/>
-              <a:t> </a:t>
-            </a:r>
-            <a:r>
-              <a:rPr/>
-              <a:t>History</a:t>
-            </a:r>
-            <a:r>
-              <a:rPr/>
-              <a:t> </a:t>
-            </a:r>
-            <a:r>
-              <a:rPr/>
-              <a:t>of</a:t>
-            </a:r>
-            <a:r>
-              <a:rPr/>
-              <a:t> </a:t>
-            </a:r>
-            <a:r>
-              <a:rPr/>
-              <a:t>Weakening</a:t>
-            </a:r>
-            <a:r>
-              <a:rPr/>
-              <a:t> </a:t>
-            </a:r>
-            <a:r>
-              <a:rPr/>
-              <a:t>Solvency</a:t>
-            </a:r>
-            <a:r>
-              <a:rPr/>
-              <a:t> </a:t>
-            </a:r>
-            <a:r>
-              <a:rPr/>
-              <a:t>(2001-2019)</a:t>
-            </a:r>
-            <a:r>
-              <a:rPr/>
-              <a:t> </a:t>
-            </a:r>
-            <a:r>
-              <a:rPr/>
-              <a:t>w/</a:t>
-            </a:r>
-            <a:r>
-              <a:rPr/>
-              <a:t> </a:t>
-            </a:r>
-            <a:r>
-              <a:rPr/>
-              <a:t>R</a:t>
-            </a:r>
-            <a:r>
-              <a:rPr/>
-              <a:t> </a:t>
-            </a:r>
-            <a:r>
-              <a:rPr/>
-              <a:t>(areaPlot())</a:t>
+              <a:t>A History of Weakening Solvency (2001-2019) w/ R (areaPlot())</a:t>
             </a:r>
           </a:p>
         </p:txBody>
       </p:sp>
       <p:pic>
         <p:nvPicPr>
-          <p:cNvPr descr="SamplePPT_files/figure-pptx/debt-1.png" id="0" name="Picture 1"/>
+          <p:cNvPr id="3" name="Picture 1" descr="SamplePPT_files/figure-pptx/debt-1.png"/>
           <p:cNvPicPr>
             <a:picLocks noGrp="1" noChangeAspect="1"/>
           </p:cNvPicPr>
@@ -3903,6 +2275,9 @@
       </p:pic>
     </p:spTree>
   </p:cSld>
+  <p:clrMapOvr>
+    <a:masterClrMapping/>
+  </p:clrMapOvr>
 </p:sld>
 </file>
 
@@ -3946,83 +2321,18 @@
           <a:bodyPr/>
           <a:lstStyle/>
           <a:p>
-            <a:pPr lvl="0" marL="0" indent="0">
+            <a:pPr marL="0" lvl="0" indent="0">
               <a:buNone/>
             </a:pPr>
             <a:r>
-              <a:rPr/>
-              <a:t>A</a:t>
-            </a:r>
-            <a:r>
-              <a:rPr/>
-              <a:t> </a:t>
-            </a:r>
-            <a:r>
-              <a:rPr/>
-              <a:t>History</a:t>
-            </a:r>
-            <a:r>
-              <a:rPr/>
-              <a:t> </a:t>
-            </a:r>
-            <a:r>
-              <a:rPr/>
-              <a:t>of</a:t>
-            </a:r>
-            <a:r>
-              <a:rPr/>
-              <a:t> </a:t>
-            </a:r>
-            <a:r>
-              <a:rPr/>
-              <a:t>Investment</a:t>
-            </a:r>
-            <a:r>
-              <a:rPr/>
-              <a:t> </a:t>
-            </a:r>
-            <a:r>
-              <a:rPr/>
-              <a:t>Returns</a:t>
-            </a:r>
-            <a:r>
-              <a:rPr/>
-              <a:t> </a:t>
-            </a:r>
-            <a:r>
-              <a:rPr/>
-              <a:t>(2001-2019)</a:t>
-            </a:r>
-            <a:r>
-              <a:rPr/>
-              <a:t> </a:t>
-            </a:r>
-            <a:r>
-              <a:rPr/>
-              <a:t>w/</a:t>
-            </a:r>
-            <a:r>
-              <a:rPr/>
-              <a:t> </a:t>
-            </a:r>
-            <a:r>
-              <a:rPr/>
-              <a:t>R</a:t>
-            </a:r>
-            <a:r>
-              <a:rPr/>
-              <a:t> </a:t>
-            </a:r>
-            <a:r>
-              <a:rPr/>
-              <a:t>(linePlot())</a:t>
+              <a:t>A History of Investment Returns (2001-2019) w/ R (linePlot())</a:t>
             </a:r>
           </a:p>
         </p:txBody>
       </p:sp>
       <p:pic>
         <p:nvPicPr>
-          <p:cNvPr descr="SamplePPT_files/figure-pptx/graph-1.png" id="0" name="Picture 1"/>
+          <p:cNvPr id="3" name="Picture 1" descr="SamplePPT_files/figure-pptx/graph-1.png"/>
           <p:cNvPicPr>
             <a:picLocks noGrp="1" noChangeAspect="1"/>
           </p:cNvPicPr>
@@ -4052,6 +2362,9 @@
       </p:pic>
     </p:spTree>
   </p:cSld>
+  <p:clrMapOvr>
+    <a:masterClrMapping/>
+  </p:clrMapOvr>
 </p:sld>
 </file>
 
@@ -4095,67 +2408,18 @@
           <a:bodyPr/>
           <a:lstStyle/>
           <a:p>
-            <a:pPr lvl="0" marL="0" indent="0">
+            <a:pPr marL="0" lvl="0" indent="0">
               <a:buNone/>
             </a:pPr>
             <a:r>
-              <a:rPr/>
-              <a:t>S&amp;P500</a:t>
-            </a:r>
-            <a:r>
-              <a:rPr/>
-              <a:t> </a:t>
-            </a:r>
-            <a:r>
-              <a:rPr/>
-              <a:t>vs. Funded</a:t>
-            </a:r>
-            <a:r>
-              <a:rPr/>
-              <a:t> </a:t>
-            </a:r>
-            <a:r>
-              <a:rPr/>
-              <a:t>Ratio</a:t>
-            </a:r>
-            <a:r>
-              <a:rPr/>
-              <a:t> </a:t>
-            </a:r>
-            <a:r>
-              <a:rPr/>
-              <a:t>(2001-2019)</a:t>
-            </a:r>
-            <a:r>
-              <a:rPr/>
-              <a:t> </a:t>
-            </a:r>
-            <a:r>
-              <a:rPr/>
-              <a:t>w/</a:t>
-            </a:r>
-            <a:r>
-              <a:rPr/>
-              <a:t> </a:t>
-            </a:r>
-            <a:r>
-              <a:rPr/>
-              <a:t>R</a:t>
-            </a:r>
-            <a:r>
-              <a:rPr/>
-              <a:t> </a:t>
-            </a:r>
-            <a:r>
-              <a:rPr/>
-              <a:t>(areaPlot())</a:t>
+              <a:t>S&amp;P500 vs. Funded Ratio (2001-2019) w/ R (areaPlot())</a:t>
             </a:r>
           </a:p>
         </p:txBody>
       </p:sp>
       <p:pic>
         <p:nvPicPr>
-          <p:cNvPr descr="SamplePPT_files/figure-pptx/sp500-1.png" id="0" name="Picture 1"/>
+          <p:cNvPr id="3" name="Picture 1" descr="SamplePPT_files/figure-pptx/sp500-1.png"/>
           <p:cNvPicPr>
             <a:picLocks noGrp="1" noChangeAspect="1"/>
           </p:cNvPicPr>
@@ -4185,6 +2449,9 @@
       </p:pic>
     </p:spTree>
   </p:cSld>
+  <p:clrMapOvr>
+    <a:masterClrMapping/>
+  </p:clrMapOvr>
 </p:sld>
 </file>
 
@@ -4228,51 +2495,18 @@
           <a:bodyPr/>
           <a:lstStyle/>
           <a:p>
-            <a:pPr lvl="0" marL="0" indent="0">
+            <a:pPr marL="0" lvl="0" indent="0">
               <a:buNone/>
             </a:pPr>
             <a:r>
-              <a:rPr/>
-              <a:t>Asset</a:t>
-            </a:r>
-            <a:r>
-              <a:rPr/>
-              <a:t> </a:t>
-            </a:r>
-            <a:r>
-              <a:rPr/>
-              <a:t>Allocation</a:t>
-            </a:r>
-            <a:r>
-              <a:rPr/>
-              <a:t> </a:t>
-            </a:r>
-            <a:r>
-              <a:rPr/>
-              <a:t>w/</a:t>
-            </a:r>
-            <a:r>
-              <a:rPr/>
-              <a:t> </a:t>
-            </a:r>
-            <a:r>
-              <a:rPr/>
-              <a:t>R</a:t>
-            </a:r>
-            <a:r>
-              <a:rPr/>
-              <a:t> </a:t>
-            </a:r>
-            <a:r>
-              <a:rPr/>
-              <a:t>(custom)</a:t>
+              <a:t>Asset Allocation w/ R (custom)</a:t>
             </a:r>
           </a:p>
         </p:txBody>
       </p:sp>
       <p:pic>
         <p:nvPicPr>
-          <p:cNvPr descr="SamplePPT_files/figure-pptx/assets-1.png" id="0" name="Picture 1"/>
+          <p:cNvPr id="3" name="Picture 1" descr="SamplePPT_files/figure-pptx/assets-1.png"/>
           <p:cNvPicPr>
             <a:picLocks noGrp="1" noChangeAspect="1"/>
           </p:cNvPicPr>
@@ -4302,6 +2536,9 @@
       </p:pic>
     </p:spTree>
   </p:cSld>
+  <p:clrMapOvr>
+    <a:masterClrMapping/>
+  </p:clrMapOvr>
 </p:sld>
 </file>
 
@@ -4345,59 +2582,18 @@
           <a:bodyPr/>
           <a:lstStyle/>
           <a:p>
-            <a:pPr lvl="0" marL="0" indent="0">
+            <a:pPr marL="0" lvl="0" indent="0">
               <a:buNone/>
             </a:pPr>
             <a:r>
-              <a:rPr/>
-              <a:t>Negative</a:t>
-            </a:r>
-            <a:r>
-              <a:rPr/>
-              <a:t> </a:t>
-            </a:r>
-            <a:r>
-              <a:rPr/>
-              <a:t>Amortization</a:t>
-            </a:r>
-            <a:r>
-              <a:rPr/>
-              <a:t> </a:t>
-            </a:r>
-            <a:r>
-              <a:rPr/>
-              <a:t>Growth</a:t>
-            </a:r>
-            <a:r>
-              <a:rPr/>
-              <a:t> </a:t>
-            </a:r>
-            <a:r>
-              <a:rPr/>
-              <a:t>w/</a:t>
-            </a:r>
-            <a:r>
-              <a:rPr/>
-              <a:t> </a:t>
-            </a:r>
-            <a:r>
-              <a:rPr/>
-              <a:t>R</a:t>
-            </a:r>
-            <a:r>
-              <a:rPr/>
-              <a:t> </a:t>
-            </a:r>
-            <a:r>
-              <a:rPr/>
-              <a:t>(custom)</a:t>
+              <a:t>Negative Amortization Growth w/ R (custom)</a:t>
             </a:r>
           </a:p>
         </p:txBody>
       </p:sp>
       <p:pic>
         <p:nvPicPr>
-          <p:cNvPr descr="SamplePPT_files/figure-pptx/neg.amo-1.png" id="0" name="Picture 1"/>
+          <p:cNvPr id="3" name="Picture 1" descr="SamplePPT_files/figure-pptx/neg.amo-1.png"/>
           <p:cNvPicPr>
             <a:picLocks noGrp="1" noChangeAspect="1"/>
           </p:cNvPicPr>
@@ -4427,6 +2623,9 @@
       </p:pic>
     </p:spTree>
   </p:cSld>
+  <p:clrMapOvr>
+    <a:masterClrMapping/>
+  </p:clrMapOvr>
 </p:sld>
 </file>
 
@@ -4470,11 +2669,10 @@
           <a:bodyPr/>
           <a:lstStyle/>
           <a:p>
-            <a:pPr lvl="0" marL="0" indent="0">
+            <a:pPr marL="0" lvl="0" indent="0">
               <a:buNone/>
             </a:pPr>
             <a:r>
-              <a:rPr/>
               <a:t>References</a:t>
             </a:r>
           </a:p>
@@ -4525,6 +2723,9 @@
       </p:sp>
     </p:spTree>
   </p:cSld>
+  <p:clrMapOvr>
+    <a:masterClrMapping/>
+  </p:clrMapOvr>
 </p:sld>
 </file>
 

</xml_diff>

<commit_message>
Updated SamplePPT w/ Gain/Loss graph
</commit_message>
<xml_diff>
--- a/DeckUpdate/SamplePPT.pptx
+++ b/DeckUpdate/SamplePPT.pptx
@@ -14,6 +14,7 @@
     <p:sldId id="262" r:id="rId8"/>
     <p:sldId id="263" r:id="rId9"/>
     <p:sldId id="264" r:id="rId10"/>
+    <p:sldId id="265" r:id="rId11"/>
   </p:sldIdLst>
   <p:sldSz cx="9144000" cy="6858000" type="screen4x3"/>
   <p:notesSz cx="6858000" cy="9144000"/>
@@ -363,7 +364,7 @@
           <a:p>
             <a:fld id="{10302D39-B686-2742-A69B-CE6D46FC9A4E}" type="datetime4">
               <a:rPr lang="en-US" smtClean="0"/>
-              <a:t>January 2, 2021</a:t>
+              <a:t>January 5, 2021</a:t>
             </a:fld>
             <a:endParaRPr lang="en-US" dirty="0"/>
           </a:p>
@@ -684,7 +685,7 @@
           <a:p>
             <a:fld id="{585AD263-A788-3145-8D38-AEBC1D444AEE}" type="datetime4">
               <a:rPr lang="en-US" smtClean="0"/>
-              <a:t>January 2, 2021</a:t>
+              <a:t>January 5, 2021</a:t>
             </a:fld>
             <a:endParaRPr lang="en-US" dirty="0"/>
           </a:p>
@@ -974,7 +975,7 @@
           <a:p>
             <a:fld id="{B606C5D1-9323-1B45-8355-7D55EA8EE66A}" type="datetime4">
               <a:rPr lang="en-US" smtClean="0"/>
-              <a:t>January 2, 2021</a:t>
+              <a:t>January 5, 2021</a:t>
             </a:fld>
             <a:endParaRPr lang="en-US" dirty="0"/>
           </a:p>
@@ -1222,7 +1223,7 @@
           <a:p>
             <a:fld id="{A4108F21-3CFE-3045-9ABB-E1E1413BA1A1}" type="datetime4">
               <a:rPr lang="en-US" smtClean="0"/>
-              <a:t>January 2, 2021</a:t>
+              <a:t>January 5, 2021</a:t>
             </a:fld>
             <a:endParaRPr lang="en-US" dirty="0"/>
           </a:p>
@@ -1670,7 +1671,7 @@
           <a:p>
             <a:fld id="{5EF76A7A-0506-6C4D-8382-BFC753915B9A}" type="datetime4">
               <a:rPr lang="en-US" smtClean="0"/>
-              <a:t>January 2, 2021</a:t>
+              <a:t>January 5, 2021</a:t>
             </a:fld>
             <a:endParaRPr lang="en-US" dirty="0"/>
           </a:p>
@@ -2196,6 +2197,106 @@
 </p:sld>
 </file>
 
+<file path=ppt/slides/slide10.xml><?xml version="1.0" encoding="utf-8"?>
+<p:sld xmlns:a="http://schemas.openxmlformats.org/drawingml/2006/main" xmlns:r="http://schemas.openxmlformats.org/officeDocument/2006/relationships" xmlns:p="http://schemas.openxmlformats.org/presentationml/2006/main">
+  <p:cSld>
+    <p:spTree>
+      <p:nvGrpSpPr>
+        <p:cNvPr id="1" name=""/>
+        <p:cNvGrpSpPr/>
+        <p:nvPr/>
+      </p:nvGrpSpPr>
+      <p:grpSpPr>
+        <a:xfrm>
+          <a:off x="0" y="0"/>
+          <a:ext cx="0" cy="0"/>
+          <a:chOff x="0" y="0"/>
+          <a:chExt cx="0" cy="0"/>
+        </a:xfrm>
+      </p:grpSpPr>
+      <p:sp>
+        <p:nvSpPr>
+          <p:cNvPr id="2" name="Title 1"/>
+          <p:cNvSpPr>
+            <a:spLocks noGrp="1"/>
+          </p:cNvSpPr>
+          <p:nvPr>
+            <p:ph type="title" hasCustomPrompt="1"/>
+          </p:nvPr>
+        </p:nvSpPr>
+        <p:spPr>
+          <a:xfrm>
+            <a:off x="457200" y="533400"/>
+            <a:ext cx="7864475" cy="990600"/>
+          </a:xfrm>
+          <a:prstGeom prst="rect">
+            <a:avLst/>
+          </a:prstGeom>
+        </p:spPr>
+        <p:txBody>
+          <a:bodyPr/>
+          <a:lstStyle/>
+          <a:p>
+            <a:pPr marL="0" lvl="0" indent="0">
+              <a:buNone/>
+            </a:pPr>
+            <a:r>
+              <a:t>References</a:t>
+            </a:r>
+          </a:p>
+        </p:txBody>
+      </p:sp>
+      <p:sp>
+        <p:nvSpPr>
+          <p:cNvPr id="3" name="Content Placeholder 2"/>
+          <p:cNvSpPr>
+            <a:spLocks noGrp="1"/>
+          </p:cNvSpPr>
+          <p:nvPr>
+            <p:ph idx="1"/>
+          </p:nvPr>
+        </p:nvSpPr>
+        <p:spPr/>
+        <p:txBody>
+          <a:bodyPr/>
+          <a:lstStyle/>
+          <a:p>
+            <a:pPr lvl="1"/>
+            <a:r>
+              <a:rPr>
+                <a:hlinkClick r:id="rId2"/>
+              </a:rPr>
+              <a:t>https://github.com/ReasonFoundation/GraphicsR</a:t>
+            </a:r>
+          </a:p>
+          <a:p>
+            <a:pPr lvl="1"/>
+            <a:r>
+              <a:rPr>
+                <a:hlinkClick r:id="rId3"/>
+              </a:rPr>
+              <a:t>https://rstudio.com/wp-content/uploads/2015/03/rmarkdown-reference.pdf</a:t>
+            </a:r>
+          </a:p>
+          <a:p>
+            <a:pPr lvl="1"/>
+            <a:r>
+              <a:rPr>
+                <a:hlinkClick r:id="rId4"/>
+              </a:rPr>
+              <a:t>https://bookdown.org/yihui/rmarkdown/</a:t>
+            </a:r>
+          </a:p>
+        </p:txBody>
+      </p:sp>
+    </p:spTree>
+  </p:cSld>
+  <p:clrMapOvr>
+    <a:masterClrMapping/>
+  </p:clrMapOvr>
+</p:sld>
+</file>
+
 <file path=ppt/slides/slide2.xml><?xml version="1.0" encoding="utf-8"?>
 <p:sld xmlns:a="http://schemas.openxmlformats.org/drawingml/2006/main" xmlns:r="http://schemas.openxmlformats.org/officeDocument/2006/relationships" xmlns:p="http://schemas.openxmlformats.org/presentationml/2006/main">
   <p:cSld>
@@ -2458,14 +2559,14 @@
               <a:buNone/>
             </a:pPr>
             <a:r>
-              <a:t>A History of Investment Returns (2001-2020) w/ R (linePlot())</a:t>
+              <a:t>Causes of Pension Debt w/ R (custom Plotly-Image)</a:t>
             </a:r>
           </a:p>
         </p:txBody>
       </p:sp>
       <p:pic>
         <p:nvPicPr>
-          <p:cNvPr id="3" name="Picture 1" descr="SamplePPT_files/figure-pptx/graph-1.png"/>
+          <p:cNvPr id="3" name="Picture 1" descr="surface-plot.png"/>
           <p:cNvPicPr>
             <a:picLocks noGrp="1" noChangeAspect="1"/>
           </p:cNvPicPr>
@@ -2479,8 +2580,8 @@
         </p:blipFill>
         <p:spPr bwMode="auto">
           <a:xfrm>
-            <a:off x="673100" y="1600200"/>
-            <a:ext cx="7797800" cy="4876800"/>
+            <a:off x="1155700" y="1600200"/>
+            <a:ext cx="6832600" cy="4876800"/>
           </a:xfrm>
           <a:prstGeom prst="rect">
             <a:avLst/>
@@ -2545,14 +2646,14 @@
               <a:buNone/>
             </a:pPr>
             <a:r>
-              <a:t>S&amp;P500 vs. Funded Ratio (2001-2019) w/ R (areaPlot())</a:t>
+              <a:t>A History of Investment Returns (2001-2020) w/ R (linePlot())</a:t>
             </a:r>
           </a:p>
         </p:txBody>
       </p:sp>
       <p:pic>
         <p:nvPicPr>
-          <p:cNvPr id="3" name="Picture 1" descr="SamplePPT_files/figure-pptx/sp500-1.png"/>
+          <p:cNvPr id="3" name="Picture 1" descr="SamplePPT_files/figure-pptx/graph-1.png"/>
           <p:cNvPicPr>
             <a:picLocks noGrp="1" noChangeAspect="1"/>
           </p:cNvPicPr>
@@ -2632,23 +2733,14 @@
               <a:buNone/>
             </a:pPr>
             <a:r>
-              <a:rPr dirty="0"/>
-              <a:t>Asset Allocation (2001-2019</a:t>
-            </a:r>
-            <a:r>
-              <a:rPr lang="en-US" dirty="0"/>
-              <a:t>)</a:t>
-            </a:r>
-            <a:r>
-              <a:rPr dirty="0"/>
-              <a:t> w/ R (custom)</a:t>
+              <a:t>S&amp;P500 vs. Funded Ratio (2001-2019) w/ R (areaPlot())</a:t>
             </a:r>
           </a:p>
         </p:txBody>
       </p:sp>
       <p:pic>
         <p:nvPicPr>
-          <p:cNvPr id="3" name="Picture 1" descr="SamplePPT_files/figure-pptx/assets-1.png"/>
+          <p:cNvPr id="3" name="Picture 1" descr="SamplePPT_files/figure-pptx/sp500-1.png"/>
           <p:cNvPicPr>
             <a:picLocks noGrp="1" noChangeAspect="1"/>
           </p:cNvPicPr>
@@ -2728,14 +2820,14 @@
               <a:buNone/>
             </a:pPr>
             <a:r>
-              <a:t>Change in Risk-Free Rate vs. Discount Rate (2001-2019) w/ R (linePlot())</a:t>
+              <a:t>Asset Allocation (2001-2019) w/ R (custom)</a:t>
             </a:r>
           </a:p>
         </p:txBody>
       </p:sp>
       <p:pic>
         <p:nvPicPr>
-          <p:cNvPr id="3" name="Picture 1" descr="SamplePPT_files/figure-pptx/treasury-1.png"/>
+          <p:cNvPr id="3" name="Picture 1" descr="SamplePPT_files/figure-pptx/assets-1.png"/>
           <p:cNvPicPr>
             <a:picLocks noGrp="1" noChangeAspect="1"/>
           </p:cNvPicPr>
@@ -2815,14 +2907,14 @@
               <a:buNone/>
             </a:pPr>
             <a:r>
-              <a:t>Negative Amortization Growth w/ R (custom)</a:t>
+              <a:t>Change in Risk-Free Rate vs. Discount Rate (2001-2019) w/ R (linePlot())</a:t>
             </a:r>
           </a:p>
         </p:txBody>
       </p:sp>
       <p:pic>
         <p:nvPicPr>
-          <p:cNvPr id="3" name="Picture 1" descr="SamplePPT_files/figure-pptx/neg.amo-1.png"/>
+          <p:cNvPr id="3" name="Picture 1" descr="SamplePPT_files/figure-pptx/treasury-1.png"/>
           <p:cNvPicPr>
             <a:picLocks noGrp="1" noChangeAspect="1"/>
           </p:cNvPicPr>
@@ -2902,54 +2994,41 @@
               <a:buNone/>
             </a:pPr>
             <a:r>
-              <a:t>References</a:t>
-            </a:r>
-          </a:p>
-        </p:txBody>
-      </p:sp>
-      <p:sp>
-        <p:nvSpPr>
-          <p:cNvPr id="3" name="Content Placeholder 2"/>
-          <p:cNvSpPr>
-            <a:spLocks noGrp="1"/>
-          </p:cNvSpPr>
-          <p:nvPr>
-            <p:ph idx="1"/>
-          </p:nvPr>
-        </p:nvSpPr>
-        <p:spPr/>
-        <p:txBody>
-          <a:bodyPr/>
-          <a:lstStyle/>
-          <a:p>
-            <a:pPr lvl="1"/>
-            <a:r>
-              <a:rPr>
-                <a:hlinkClick r:id="rId2"/>
-              </a:rPr>
-              <a:t>https://github.com/ReasonFoundation/GraphicsR</a:t>
-            </a:r>
-          </a:p>
-          <a:p>
-            <a:pPr lvl="1"/>
-            <a:r>
-              <a:rPr>
-                <a:hlinkClick r:id="rId3"/>
-              </a:rPr>
-              <a:t>https://rstudio.com/wp-content/uploads/2015/03/rmarkdown-reference.pdf</a:t>
-            </a:r>
-          </a:p>
-          <a:p>
-            <a:pPr lvl="1"/>
-            <a:r>
-              <a:rPr>
-                <a:hlinkClick r:id="rId4"/>
-              </a:rPr>
-              <a:t>https://bookdown.org/yihui/rmarkdown/</a:t>
-            </a:r>
-          </a:p>
-        </p:txBody>
-      </p:sp>
+              <a:t>Negative Amortization Growth w/ R (custom)</a:t>
+            </a:r>
+          </a:p>
+        </p:txBody>
+      </p:sp>
+      <p:pic>
+        <p:nvPicPr>
+          <p:cNvPr id="3" name="Picture 1" descr="SamplePPT_files/figure-pptx/neg.amo-1.png"/>
+          <p:cNvPicPr>
+            <a:picLocks noGrp="1" noChangeAspect="1"/>
+          </p:cNvPicPr>
+          <p:nvPr/>
+        </p:nvPicPr>
+        <p:blipFill>
+          <a:blip r:embed="rId2"/>
+          <a:stretch>
+            <a:fillRect/>
+          </a:stretch>
+        </p:blipFill>
+        <p:spPr bwMode="auto">
+          <a:xfrm>
+            <a:off x="673100" y="1600200"/>
+            <a:ext cx="7797800" cy="4876800"/>
+          </a:xfrm>
+          <a:prstGeom prst="rect">
+            <a:avLst/>
+          </a:prstGeom>
+          <a:noFill/>
+          <a:ln w="9525">
+            <a:noFill/>
+            <a:headEnd/>
+            <a:tailEnd/>
+          </a:ln>
+        </p:spPr>
+      </p:pic>
     </p:spTree>
   </p:cSld>
   <p:clrMapOvr>

</xml_diff>

<commit_message>
Updated SamplePPT w/ glPlot
</commit_message>
<xml_diff>
--- a/DeckUpdate/SamplePPT.pptx
+++ b/DeckUpdate/SamplePPT.pptx
@@ -364,7 +364,7 @@
           <a:p>
             <a:fld id="{10302D39-B686-2742-A69B-CE6D46FC9A4E}" type="datetime4">
               <a:rPr lang="en-US" smtClean="0"/>
-              <a:t>January 5, 2021</a:t>
+              <a:t>January 6, 2021</a:t>
             </a:fld>
             <a:endParaRPr lang="en-US" dirty="0"/>
           </a:p>
@@ -685,7 +685,7 @@
           <a:p>
             <a:fld id="{585AD263-A788-3145-8D38-AEBC1D444AEE}" type="datetime4">
               <a:rPr lang="en-US" smtClean="0"/>
-              <a:t>January 5, 2021</a:t>
+              <a:t>January 6, 2021</a:t>
             </a:fld>
             <a:endParaRPr lang="en-US" dirty="0"/>
           </a:p>
@@ -975,7 +975,7 @@
           <a:p>
             <a:fld id="{B606C5D1-9323-1B45-8355-7D55EA8EE66A}" type="datetime4">
               <a:rPr lang="en-US" smtClean="0"/>
-              <a:t>January 5, 2021</a:t>
+              <a:t>January 6, 2021</a:t>
             </a:fld>
             <a:endParaRPr lang="en-US" dirty="0"/>
           </a:p>
@@ -1223,7 +1223,7 @@
           <a:p>
             <a:fld id="{A4108F21-3CFE-3045-9ABB-E1E1413BA1A1}" type="datetime4">
               <a:rPr lang="en-US" smtClean="0"/>
-              <a:t>January 5, 2021</a:t>
+              <a:t>January 6, 2021</a:t>
             </a:fld>
             <a:endParaRPr lang="en-US" dirty="0"/>
           </a:p>
@@ -1671,7 +1671,7 @@
           <a:p>
             <a:fld id="{5EF76A7A-0506-6C4D-8382-BFC753915B9A}" type="datetime4">
               <a:rPr lang="en-US" smtClean="0"/>
-              <a:t>January 5, 2021</a:t>
+              <a:t>January 6, 2021</a:t>
             </a:fld>
             <a:endParaRPr lang="en-US" dirty="0"/>
           </a:p>
@@ -2559,14 +2559,14 @@
               <a:buNone/>
             </a:pPr>
             <a:r>
-              <a:t>Causes of Pension Debt w/ R (custom Plotly-Image)</a:t>
+              <a:t>Causes of Pension Debt (2001-2019) w/ R (custom Plotly-Image)</a:t>
             </a:r>
           </a:p>
         </p:txBody>
       </p:sp>
       <p:pic>
         <p:nvPicPr>
-          <p:cNvPr id="3" name="Picture 1" descr="surface-plot.png"/>
+          <p:cNvPr id="3" name="Picture 1" descr="GainLoss-plot.png"/>
           <p:cNvPicPr>
             <a:picLocks noGrp="1" noChangeAspect="1"/>
           </p:cNvPicPr>
@@ -2580,8 +2580,8 @@
         </p:blipFill>
         <p:spPr bwMode="auto">
           <a:xfrm>
-            <a:off x="1155700" y="1600200"/>
-            <a:ext cx="6832600" cy="4876800"/>
+            <a:off x="774700" y="1600200"/>
+            <a:ext cx="7581900" cy="4876800"/>
           </a:xfrm>
           <a:prstGeom prst="rect">
             <a:avLst/>

</xml_diff>

<commit_message>
Updated alt.DR for SamplePPT
</commit_message>
<xml_diff>
--- a/DeckUpdate/SamplePPT.pptx
+++ b/DeckUpdate/SamplePPT.pptx
@@ -364,7 +364,7 @@
           <a:p>
             <a:fld id="{10302D39-B686-2742-A69B-CE6D46FC9A4E}" type="datetime4">
               <a:rPr lang="en-US" smtClean="0"/>
-              <a:t>January 6, 2021</a:t>
+              <a:t>January 7, 2021</a:t>
             </a:fld>
             <a:endParaRPr lang="en-US" dirty="0"/>
           </a:p>
@@ -685,7 +685,7 @@
           <a:p>
             <a:fld id="{585AD263-A788-3145-8D38-AEBC1D444AEE}" type="datetime4">
               <a:rPr lang="en-US" smtClean="0"/>
-              <a:t>January 6, 2021</a:t>
+              <a:t>January 7, 2021</a:t>
             </a:fld>
             <a:endParaRPr lang="en-US" dirty="0"/>
           </a:p>
@@ -975,7 +975,7 @@
           <a:p>
             <a:fld id="{B606C5D1-9323-1B45-8355-7D55EA8EE66A}" type="datetime4">
               <a:rPr lang="en-US" smtClean="0"/>
-              <a:t>January 6, 2021</a:t>
+              <a:t>January 7, 2021</a:t>
             </a:fld>
             <a:endParaRPr lang="en-US" dirty="0"/>
           </a:p>
@@ -1223,7 +1223,7 @@
           <a:p>
             <a:fld id="{A4108F21-3CFE-3045-9ABB-E1E1413BA1A1}" type="datetime4">
               <a:rPr lang="en-US" smtClean="0"/>
-              <a:t>January 6, 2021</a:t>
+              <a:t>January 7, 2021</a:t>
             </a:fld>
             <a:endParaRPr lang="en-US" dirty="0"/>
           </a:p>
@@ -1671,7 +1671,7 @@
           <a:p>
             <a:fld id="{5EF76A7A-0506-6C4D-8382-BFC753915B9A}" type="datetime4">
               <a:rPr lang="en-US" smtClean="0"/>
-              <a:t>January 6, 2021</a:t>
+              <a:t>January 7, 2021</a:t>
             </a:fld>
             <a:endParaRPr lang="en-US" dirty="0"/>
           </a:p>
@@ -2184,7 +2184,7 @@
               <a:buNone/>
             </a:pPr>
             <a:r>
-              <a:t>12/12/2020</a:t>
+              <a:t>01/05/2021</a:t>
             </a:r>
           </a:p>
         </p:txBody>
@@ -2900,14 +2900,33 @@
           </a:prstGeom>
         </p:spPr>
         <p:txBody>
-          <a:bodyPr/>
+          <a:bodyPr>
+            <a:normAutofit fontScale="90000"/>
+          </a:bodyPr>
           <a:lstStyle/>
           <a:p>
             <a:pPr marL="0" lvl="0" indent="0">
               <a:buNone/>
             </a:pPr>
             <a:r>
-              <a:t>Change in Risk-Free Rate vs. Discount Rate (2001-2019) w/ R (linePlot())</a:t>
+              <a:rPr dirty="0"/>
+              <a:t>Change in Risk-Free Rate vs. Discount Rate (2001-20</a:t>
+            </a:r>
+            <a:r>
+              <a:rPr lang="en-US" dirty="0"/>
+              <a:t>20</a:t>
+            </a:r>
+            <a:r>
+              <a:rPr dirty="0"/>
+              <a:t>) w/ R (</a:t>
+            </a:r>
+            <a:r>
+              <a:rPr dirty="0" err="1"/>
+              <a:t>linePlot</a:t>
+            </a:r>
+            <a:r>
+              <a:rPr dirty="0"/>
+              <a:t>())</a:t>
             </a:r>
           </a:p>
         </p:txBody>

</xml_diff>